<commit_message>
Update relation about Nodes
Update relation about Nodes
</commit_message>
<xml_diff>
--- a/doc/dynamic view 15060900.pptx
+++ b/doc/dynamic view 15060900.pptx
@@ -110,58 +110,17 @@
   </p:defaultTextStyle>
   <p:extLst>
     <p:ext uri="{521415D9-36F7-43E2-AB2F-B90AF26B5E84}">
-      <p14:sectionLst xmlns:p14="http://schemas.microsoft.com/office/powerpoint/2010/main" xmlns="">
+      <p14:sectionLst xmlns:p14="http://schemas.microsoft.com/office/powerpoint/2010/main">
         <p14:section name="기본 구역" id="{8842BCD3-E84E-4C92-B413-F11C840B25B4}">
           <p14:sldIdLst>
-            <p14:sldId id="256"/>
-            <p14:sldId id="257"/>
-            <p14:sldId id="258"/>
-            <p14:sldId id="259"/>
-            <p14:sldId id="260"/>
-            <p14:sldId id="261"/>
-            <p14:sldId id="262"/>
-            <p14:sldId id="263"/>
-            <p14:sldId id="264"/>
-            <p14:sldId id="265"/>
-            <p14:sldId id="266"/>
-            <p14:sldId id="267"/>
-            <p14:sldId id="269"/>
-            <p14:sldId id="270"/>
-            <p14:sldId id="271"/>
-            <p14:sldId id="272"/>
-            <p14:sldId id="273"/>
-            <p14:sldId id="274"/>
-            <p14:sldId id="275"/>
-            <p14:sldId id="276"/>
-            <p14:sldId id="278"/>
-            <p14:sldId id="277"/>
-            <p14:sldId id="279"/>
-            <p14:sldId id="280"/>
-            <p14:sldId id="281"/>
-            <p14:sldId id="282"/>
-            <p14:sldId id="283"/>
-            <p14:sldId id="284"/>
-            <p14:sldId id="285"/>
-            <p14:sldId id="287"/>
-            <p14:sldId id="289"/>
-            <p14:sldId id="288"/>
-            <p14:sldId id="290"/>
-            <p14:sldId id="292"/>
-            <p14:sldId id="291"/>
-            <p14:sldId id="294"/>
-            <p14:sldId id="295"/>
-            <p14:sldId id="293"/>
-            <p14:sldId id="297"/>
-            <p14:sldId id="296"/>
-            <p14:sldId id="298"/>
-            <p14:sldId id="299"/>
-            <p14:sldId id="286"/>
+            <p14:sldId id="307"/>
+            <p14:sldId id="308"/>
           </p14:sldIdLst>
         </p14:section>
       </p14:sectionLst>
     </p:ext>
     <p:ext uri="{EFAFB233-063F-42B5-8137-9DF3F51BA10A}">
-      <p15:sldGuideLst xmlns:p15="http://schemas.microsoft.com/office/powerpoint/2012/main" xmlns="">
+      <p15:sldGuideLst xmlns:p15="http://schemas.microsoft.com/office/powerpoint/2012/main">
         <p15:guide id="1" orient="horz" pos="527">
           <p15:clr>
             <a:srgbClr val="A4A3A4"/>
@@ -182,10 +141,15 @@
             <a:srgbClr val="A4A3A4"/>
           </p15:clr>
         </p15:guide>
+        <p15:guide id="5" pos="2880">
+          <p15:clr>
+            <a:srgbClr val="A4A3A4"/>
+          </p15:clr>
+        </p15:guide>
       </p15:sldGuideLst>
     </p:ext>
     <p:ext uri="{2D200454-40CA-4A62-9FC3-DE9A4176ACB9}">
-      <p15:notesGuideLst xmlns:p15="http://schemas.microsoft.com/office/powerpoint/2012/main" xmlns="">
+      <p15:notesGuideLst xmlns:p15="http://schemas.microsoft.com/office/powerpoint/2012/main">
         <p15:guide id="1" orient="horz" pos="2879">
           <p15:clr>
             <a:srgbClr val="A4A3A4"/>
@@ -300,7 +264,7 @@
               <a:pPr lvl="0">
                 <a:defRPr lang="ko-KR" altLang="en-US"/>
               </a:pPr>
-              <a:t>2015-06-09</a:t>
+              <a:t>2015-06-16</a:t>
             </a:fld>
             <a:endParaRPr lang="ko-KR" altLang="en-US"/>
           </a:p>
@@ -489,7 +453,7 @@
     </p:spTree>
     <p:extLst>
       <p:ext uri="{BB962C8B-B14F-4D97-AF65-F5344CB8AC3E}">
-        <p14:creationId xmlns:p14="http://schemas.microsoft.com/office/powerpoint/2010/main" xmlns="" val="222442409"/>
+        <p14:creationId xmlns:p14="http://schemas.microsoft.com/office/powerpoint/2010/main" val="222442409"/>
       </p:ext>
     </p:extLst>
   </p:cSld>
@@ -590,6 +554,96 @@
 </p:notesMaster>
 </file>
 
+<file path=ppt/notesSlides/notesSlide1.xml><?xml version="1.0" encoding="utf-8"?>
+<p:notes xmlns:a="http://schemas.openxmlformats.org/drawingml/2006/main" xmlns:r="http://schemas.openxmlformats.org/officeDocument/2006/relationships" xmlns:p="http://schemas.openxmlformats.org/presentationml/2006/main">
+  <p:cSld>
+    <p:spTree>
+      <p:nvGrpSpPr>
+        <p:cNvPr id="1" name=""/>
+        <p:cNvGrpSpPr/>
+        <p:nvPr/>
+      </p:nvGrpSpPr>
+      <p:grpSpPr>
+        <a:xfrm>
+          <a:off x="0" y="0"/>
+          <a:ext cx="0" cy="0"/>
+          <a:chOff x="0" y="0"/>
+          <a:chExt cx="0" cy="0"/>
+        </a:xfrm>
+      </p:grpSpPr>
+      <p:sp>
+        <p:nvSpPr>
+          <p:cNvPr id="2" name="슬라이드 이미지 개체 틀 1"/>
+          <p:cNvSpPr>
+            <a:spLocks noGrp="1" noRot="1" noChangeAspect="1"/>
+          </p:cNvSpPr>
+          <p:nvPr>
+            <p:ph type="sldImg"/>
+          </p:nvPr>
+        </p:nvSpPr>
+        <p:spPr/>
+      </p:sp>
+      <p:sp>
+        <p:nvSpPr>
+          <p:cNvPr id="3" name="슬라이드 노트 개체 틀 2"/>
+          <p:cNvSpPr>
+            <a:spLocks noGrp="1"/>
+          </p:cNvSpPr>
+          <p:nvPr>
+            <p:ph type="body" idx="1"/>
+          </p:nvPr>
+        </p:nvSpPr>
+        <p:spPr/>
+        <p:txBody>
+          <a:bodyPr/>
+          <a:lstStyle/>
+          <a:p>
+            <a:endParaRPr lang="ko-KR" altLang="en-US" dirty="0"/>
+          </a:p>
+        </p:txBody>
+      </p:sp>
+      <p:sp>
+        <p:nvSpPr>
+          <p:cNvPr id="4" name="슬라이드 번호 개체 틀 3"/>
+          <p:cNvSpPr>
+            <a:spLocks noGrp="1"/>
+          </p:cNvSpPr>
+          <p:nvPr>
+            <p:ph type="sldNum" sz="quarter" idx="10"/>
+          </p:nvPr>
+        </p:nvSpPr>
+        <p:spPr/>
+        <p:txBody>
+          <a:bodyPr/>
+          <a:lstStyle/>
+          <a:p>
+            <a:pPr lvl="0">
+              <a:defRPr lang="ko-KR" altLang="en-US"/>
+            </a:pPr>
+            <a:fld id="{16CA0CAB-945A-4D9A-9EB1-E1C8A52CAEF4}" type="slidenum">
+              <a:rPr lang="ko-KR" altLang="en-US" smtClean="0"/>
+              <a:pPr lvl="0">
+                <a:defRPr lang="ko-KR" altLang="en-US"/>
+              </a:pPr>
+              <a:t>2</a:t>
+            </a:fld>
+            <a:endParaRPr lang="ko-KR" altLang="en-US"/>
+          </a:p>
+        </p:txBody>
+      </p:sp>
+    </p:spTree>
+    <p:extLst>
+      <p:ext uri="{BB962C8B-B14F-4D97-AF65-F5344CB8AC3E}">
+        <p14:creationId xmlns:p14="http://schemas.microsoft.com/office/powerpoint/2010/main" val="2504396503"/>
+      </p:ext>
+    </p:extLst>
+  </p:cSld>
+  <p:clrMapOvr>
+    <a:masterClrMapping/>
+  </p:clrMapOvr>
+</p:notes>
+</file>
+
 <file path=ppt/slideLayouts/slideLayout1.xml><?xml version="1.0" encoding="utf-8"?>
 <p:sldLayout xmlns:a="http://schemas.openxmlformats.org/drawingml/2006/main" xmlns:r="http://schemas.openxmlformats.org/officeDocument/2006/relationships" xmlns:p="http://schemas.openxmlformats.org/presentationml/2006/main" userDrawn="1">
   <p:cSld name="30_제목 슬라이드">
@@ -619,7 +673,7 @@
           <a:blip r:embed="rId3" cstate="print">
             <a:extLst>
               <a:ext uri="{28A0092B-C50C-407E-A947-70E740481C1C}">
-                <a14:useLocalDpi xmlns:a14="http://schemas.microsoft.com/office/drawing/2010/main" xmlns="" val="0"/>
+                <a14:useLocalDpi xmlns:a14="http://schemas.microsoft.com/office/drawing/2010/main" val="0"/>
               </a:ext>
             </a:extLst>
           </a:blip>
@@ -639,7 +693,7 @@
           <a:noFill/>
           <a:extLst>
             <a:ext uri="{909E8E84-426E-40DD-AFC4-6F175D3DCCD1}">
-              <a14:hiddenFill xmlns:a14="http://schemas.microsoft.com/office/drawing/2010/main" xmlns="">
+              <a14:hiddenFill xmlns:a14="http://schemas.microsoft.com/office/drawing/2010/main">
                 <a:solidFill>
                   <a:srgbClr val="FFFFFF"/>
                 </a:solidFill>
@@ -815,7 +869,7 @@
     </p:spTree>
     <p:extLst>
       <p:ext uri="{BB962C8B-B14F-4D97-AF65-F5344CB8AC3E}">
-        <p14:creationId xmlns:p14="http://schemas.microsoft.com/office/powerpoint/2010/main" xmlns="" val="3710351474"/>
+        <p14:creationId xmlns:p14="http://schemas.microsoft.com/office/powerpoint/2010/main" val="3710351474"/>
       </p:ext>
     </p:extLst>
   </p:cSld>
@@ -995,7 +1049,7 @@
     </p:spTree>
     <p:extLst>
       <p:ext uri="{BB962C8B-B14F-4D97-AF65-F5344CB8AC3E}">
-        <p14:creationId xmlns:p14="http://schemas.microsoft.com/office/powerpoint/2010/main" xmlns="" val="649258608"/>
+        <p14:creationId xmlns:p14="http://schemas.microsoft.com/office/powerpoint/2010/main" val="649258608"/>
       </p:ext>
     </p:extLst>
   </p:cSld>
@@ -1244,7 +1298,7 @@
           <a:blip r:embed="rId5" cstate="print">
             <a:extLst>
               <a:ext uri="{28A0092B-C50C-407E-A947-70E740481C1C}">
-                <a14:useLocalDpi xmlns:a14="http://schemas.microsoft.com/office/drawing/2010/main" xmlns="" val="0"/>
+                <a14:useLocalDpi xmlns:a14="http://schemas.microsoft.com/office/drawing/2010/main" val="0"/>
               </a:ext>
             </a:extLst>
           </a:blip>
@@ -1264,7 +1318,7 @@
           <a:noFill/>
           <a:extLst>
             <a:ext uri="{909E8E84-426E-40DD-AFC4-6F175D3DCCD1}">
-              <a14:hiddenFill xmlns:a14="http://schemas.microsoft.com/office/drawing/2010/main" xmlns="">
+              <a14:hiddenFill xmlns:a14="http://schemas.microsoft.com/office/drawing/2010/main">
                 <a:solidFill>
                   <a:srgbClr val="FFFFFF"/>
                 </a:solidFill>
@@ -1276,7 +1330,7 @@
     </p:spTree>
     <p:extLst>
       <p:ext uri="{BB962C8B-B14F-4D97-AF65-F5344CB8AC3E}">
-        <p14:creationId xmlns:p14="http://schemas.microsoft.com/office/powerpoint/2010/main" xmlns="" val="117676409"/>
+        <p14:creationId xmlns:p14="http://schemas.microsoft.com/office/powerpoint/2010/main" val="117676409"/>
       </p:ext>
     </p:extLst>
   </p:cSld>
@@ -2672,8 +2726,8 @@
         </p:nvSpPr>
         <p:spPr>
           <a:xfrm>
-            <a:off x="2483768" y="5445224"/>
-            <a:ext cx="4176464" cy="720080"/>
+            <a:off x="3131841" y="5445224"/>
+            <a:ext cx="2736304" cy="720080"/>
           </a:xfrm>
           <a:prstGeom prst="rect">
             <a:avLst/>
@@ -3511,70 +3565,8 @@
         </p:nvSpPr>
         <p:spPr>
           <a:xfrm>
-            <a:off x="2555776" y="5805264"/>
-            <a:ext cx="504056" cy="288032"/>
-          </a:xfrm>
-          <a:prstGeom prst="rect">
-            <a:avLst/>
-          </a:prstGeom>
-          <a:solidFill>
-            <a:schemeClr val="tx1">
-              <a:lumMod val="85000"/>
-            </a:schemeClr>
-          </a:solidFill>
-          <a:ln w="6350">
-            <a:solidFill>
-              <a:schemeClr val="bg1"/>
-            </a:solidFill>
-          </a:ln>
-        </p:spPr>
-        <p:style>
-          <a:lnRef idx="2">
-            <a:schemeClr val="accent1">
-              <a:shade val="50000"/>
-            </a:schemeClr>
-          </a:lnRef>
-          <a:fillRef idx="1">
-            <a:schemeClr val="accent1"/>
-          </a:fillRef>
-          <a:effectRef idx="0">
-            <a:schemeClr val="accent1"/>
-          </a:effectRef>
-          <a:fontRef idx="minor">
-            <a:schemeClr val="lt1"/>
-          </a:fontRef>
-        </p:style>
-        <p:txBody>
-          <a:bodyPr rtlCol="0" anchor="ctr"/>
-          <a:lstStyle/>
-          <a:p>
-            <a:pPr algn="ctr"/>
-            <a:r>
-              <a:rPr lang="en-US" altLang="ko-KR" sz="1000" dirty="0" smtClean="0">
-                <a:solidFill>
-                  <a:schemeClr val="bg1"/>
-                </a:solidFill>
-              </a:rPr>
-              <a:t>door</a:t>
-            </a:r>
-            <a:endParaRPr lang="ko-KR" altLang="en-US" sz="1000" dirty="0">
-              <a:solidFill>
-                <a:schemeClr val="bg1"/>
-              </a:solidFill>
-            </a:endParaRPr>
-          </a:p>
-        </p:txBody>
-      </p:sp>
-      <p:sp>
-        <p:nvSpPr>
-          <p:cNvPr id="99" name="직사각형 98"/>
-          <p:cNvSpPr/>
-          <p:nvPr/>
-        </p:nvSpPr>
-        <p:spPr>
-          <a:xfrm>
-            <a:off x="3131840" y="5805264"/>
-            <a:ext cx="576064" cy="288032"/>
+            <a:off x="3491880" y="5803012"/>
+            <a:ext cx="648000" cy="288032"/>
           </a:xfrm>
           <a:prstGeom prst="rect">
             <a:avLst/>
@@ -3617,9 +3609,60 @@
                   <a:schemeClr val="bg1"/>
                 </a:solidFill>
               </a:rPr>
-              <a:t>door</a:t>
+              <a:t>Actuators</a:t>
             </a:r>
-          </a:p>
+            <a:endParaRPr lang="ko-KR" altLang="en-US" sz="800" dirty="0">
+              <a:solidFill>
+                <a:schemeClr val="bg1"/>
+              </a:solidFill>
+            </a:endParaRPr>
+          </a:p>
+        </p:txBody>
+      </p:sp>
+      <p:sp>
+        <p:nvSpPr>
+          <p:cNvPr id="99" name="직사각형 98"/>
+          <p:cNvSpPr/>
+          <p:nvPr/>
+        </p:nvSpPr>
+        <p:spPr>
+          <a:xfrm>
+            <a:off x="4211960" y="5803012"/>
+            <a:ext cx="648000" cy="288032"/>
+          </a:xfrm>
+          <a:prstGeom prst="rect">
+            <a:avLst/>
+          </a:prstGeom>
+          <a:solidFill>
+            <a:schemeClr val="tx1">
+              <a:lumMod val="85000"/>
+            </a:schemeClr>
+          </a:solidFill>
+          <a:ln w="6350">
+            <a:solidFill>
+              <a:schemeClr val="bg1"/>
+            </a:solidFill>
+          </a:ln>
+        </p:spPr>
+        <p:style>
+          <a:lnRef idx="2">
+            <a:schemeClr val="accent1">
+              <a:shade val="50000"/>
+            </a:schemeClr>
+          </a:lnRef>
+          <a:fillRef idx="1">
+            <a:schemeClr val="accent1"/>
+          </a:fillRef>
+          <a:effectRef idx="0">
+            <a:schemeClr val="accent1"/>
+          </a:effectRef>
+          <a:fontRef idx="minor">
+            <a:schemeClr val="lt1"/>
+          </a:fontRef>
+        </p:style>
+        <p:txBody>
+          <a:bodyPr rtlCol="0" anchor="ctr"/>
+          <a:lstStyle/>
           <a:p>
             <a:pPr algn="ctr"/>
             <a:r>
@@ -3628,7 +3671,7 @@
                   <a:schemeClr val="bg1"/>
                 </a:solidFill>
               </a:rPr>
-              <a:t>sensor</a:t>
+              <a:t>sensors</a:t>
             </a:r>
             <a:endParaRPr lang="ko-KR" altLang="en-US" sz="800" dirty="0">
               <a:solidFill>
@@ -3646,8 +3689,8 @@
         </p:nvSpPr>
         <p:spPr>
           <a:xfrm>
-            <a:off x="3779912" y="5805264"/>
-            <a:ext cx="504056" cy="288032"/>
+            <a:off x="4942272" y="5803012"/>
+            <a:ext cx="648000" cy="288032"/>
           </a:xfrm>
           <a:prstGeom prst="rect">
             <a:avLst/>
@@ -3690,204 +3733,7 @@
                   <a:schemeClr val="bg1"/>
                 </a:solidFill>
               </a:rPr>
-              <a:t>alarm</a:t>
-            </a:r>
-            <a:endParaRPr lang="ko-KR" altLang="en-US" sz="800" dirty="0">
-              <a:solidFill>
-                <a:schemeClr val="bg1"/>
-              </a:solidFill>
-            </a:endParaRPr>
-          </a:p>
-        </p:txBody>
-      </p:sp>
-      <p:sp>
-        <p:nvSpPr>
-          <p:cNvPr id="102" name="직사각형 101"/>
-          <p:cNvSpPr/>
-          <p:nvPr/>
-        </p:nvSpPr>
-        <p:spPr>
-          <a:xfrm>
-            <a:off x="4355976" y="5805264"/>
-            <a:ext cx="504056" cy="288032"/>
-          </a:xfrm>
-          <a:prstGeom prst="rect">
-            <a:avLst/>
-          </a:prstGeom>
-          <a:solidFill>
-            <a:schemeClr val="tx1">
-              <a:lumMod val="85000"/>
-            </a:schemeClr>
-          </a:solidFill>
-          <a:ln w="6350">
-            <a:solidFill>
-              <a:schemeClr val="bg1"/>
-            </a:solidFill>
-          </a:ln>
-        </p:spPr>
-        <p:style>
-          <a:lnRef idx="2">
-            <a:schemeClr val="accent1">
-              <a:shade val="50000"/>
-            </a:schemeClr>
-          </a:lnRef>
-          <a:fillRef idx="1">
-            <a:schemeClr val="accent1"/>
-          </a:fillRef>
-          <a:effectRef idx="0">
-            <a:schemeClr val="accent1"/>
-          </a:effectRef>
-          <a:fontRef idx="minor">
-            <a:schemeClr val="lt1"/>
-          </a:fontRef>
-        </p:style>
-        <p:txBody>
-          <a:bodyPr rtlCol="0" anchor="ctr"/>
-          <a:lstStyle/>
-          <a:p>
-            <a:pPr algn="ctr"/>
-            <a:r>
-              <a:rPr lang="en-US" altLang="ko-KR" sz="800" dirty="0" smtClean="0">
-                <a:solidFill>
-                  <a:schemeClr val="bg1"/>
-                </a:solidFill>
-              </a:rPr>
-              <a:t>light</a:t>
-            </a:r>
-            <a:endParaRPr lang="ko-KR" altLang="en-US" sz="800" dirty="0">
-              <a:solidFill>
-                <a:schemeClr val="bg1"/>
-              </a:solidFill>
-            </a:endParaRPr>
-          </a:p>
-        </p:txBody>
-      </p:sp>
-      <p:sp>
-        <p:nvSpPr>
-          <p:cNvPr id="103" name="직사각형 102"/>
-          <p:cNvSpPr/>
-          <p:nvPr/>
-        </p:nvSpPr>
-        <p:spPr>
-          <a:xfrm>
-            <a:off x="4932040" y="5805264"/>
-            <a:ext cx="504056" cy="288032"/>
-          </a:xfrm>
-          <a:prstGeom prst="rect">
-            <a:avLst/>
-          </a:prstGeom>
-          <a:solidFill>
-            <a:schemeClr val="tx1">
-              <a:lumMod val="85000"/>
-            </a:schemeClr>
-          </a:solidFill>
-          <a:ln w="6350">
-            <a:solidFill>
-              <a:schemeClr val="bg1"/>
-            </a:solidFill>
-          </a:ln>
-        </p:spPr>
-        <p:style>
-          <a:lnRef idx="2">
-            <a:schemeClr val="accent1">
-              <a:shade val="50000"/>
-            </a:schemeClr>
-          </a:lnRef>
-          <a:fillRef idx="1">
-            <a:schemeClr val="accent1"/>
-          </a:fillRef>
-          <a:effectRef idx="0">
-            <a:schemeClr val="accent1"/>
-          </a:effectRef>
-          <a:fontRef idx="minor">
-            <a:schemeClr val="lt1"/>
-          </a:fontRef>
-        </p:style>
-        <p:txBody>
-          <a:bodyPr rtlCol="0" anchor="ctr"/>
-          <a:lstStyle/>
-          <a:p>
-            <a:pPr algn="ctr"/>
-            <a:r>
-              <a:rPr lang="en-US" altLang="ko-KR" sz="800" dirty="0" smtClean="0">
-                <a:solidFill>
-                  <a:schemeClr val="bg1"/>
-                </a:solidFill>
-              </a:rPr>
-              <a:t>temp</a:t>
-            </a:r>
-          </a:p>
-          <a:p>
-            <a:pPr algn="ctr"/>
-            <a:r>
-              <a:rPr lang="en-US" altLang="ko-KR" sz="800" dirty="0" smtClean="0">
-                <a:solidFill>
-                  <a:schemeClr val="bg1"/>
-                </a:solidFill>
-              </a:rPr>
-              <a:t>sensor</a:t>
-            </a:r>
-            <a:endParaRPr lang="ko-KR" altLang="en-US" sz="800" dirty="0">
-              <a:solidFill>
-                <a:schemeClr val="bg1"/>
-              </a:solidFill>
-            </a:endParaRPr>
-          </a:p>
-        </p:txBody>
-      </p:sp>
-      <p:sp>
-        <p:nvSpPr>
-          <p:cNvPr id="104" name="직사각형 103"/>
-          <p:cNvSpPr/>
-          <p:nvPr/>
-        </p:nvSpPr>
-        <p:spPr>
-          <a:xfrm>
-            <a:off x="5508104" y="5805264"/>
-            <a:ext cx="504056" cy="288032"/>
-          </a:xfrm>
-          <a:prstGeom prst="rect">
-            <a:avLst/>
-          </a:prstGeom>
-          <a:solidFill>
-            <a:schemeClr val="tx1">
-              <a:lumMod val="85000"/>
-            </a:schemeClr>
-          </a:solidFill>
-          <a:ln w="6350">
-            <a:solidFill>
-              <a:schemeClr val="bg1"/>
-            </a:solidFill>
-          </a:ln>
-        </p:spPr>
-        <p:style>
-          <a:lnRef idx="2">
-            <a:schemeClr val="accent1">
-              <a:shade val="50000"/>
-            </a:schemeClr>
-          </a:lnRef>
-          <a:fillRef idx="1">
-            <a:schemeClr val="accent1"/>
-          </a:fillRef>
-          <a:effectRef idx="0">
-            <a:schemeClr val="accent1"/>
-          </a:effectRef>
-          <a:fontRef idx="minor">
-            <a:schemeClr val="lt1"/>
-          </a:fontRef>
-        </p:style>
-        <p:txBody>
-          <a:bodyPr rtlCol="0" anchor="ctr"/>
-          <a:lstStyle/>
-          <a:p>
-            <a:pPr algn="ctr"/>
-            <a:r>
-              <a:rPr lang="en-US" altLang="ko-KR" sz="800" dirty="0" smtClean="0">
-                <a:solidFill>
-                  <a:schemeClr val="bg1"/>
-                </a:solidFill>
-              </a:rPr>
-              <a:t>hum</a:t>
+              <a:t>Default</a:t>
             </a:r>
             <a:br>
               <a:rPr lang="en-US" altLang="ko-KR" sz="800" dirty="0" smtClean="0">
@@ -3902,7 +3748,7 @@
                   <a:schemeClr val="bg1"/>
                 </a:solidFill>
               </a:rPr>
-              <a:t>sensor</a:t>
+              <a:t>Sensors</a:t>
             </a:r>
             <a:endParaRPr lang="ko-KR" altLang="en-US" sz="800" dirty="0">
               <a:solidFill>
@@ -3912,79 +3758,6 @@
           </a:p>
         </p:txBody>
       </p:sp>
-      <p:sp>
-        <p:nvSpPr>
-          <p:cNvPr id="105" name="직사각형 104"/>
-          <p:cNvSpPr/>
-          <p:nvPr/>
-        </p:nvSpPr>
-        <p:spPr>
-          <a:xfrm>
-            <a:off x="6084168" y="5805264"/>
-            <a:ext cx="504056" cy="288032"/>
-          </a:xfrm>
-          <a:prstGeom prst="rect">
-            <a:avLst/>
-          </a:prstGeom>
-          <a:solidFill>
-            <a:schemeClr val="tx1">
-              <a:lumMod val="85000"/>
-            </a:schemeClr>
-          </a:solidFill>
-          <a:ln w="6350">
-            <a:solidFill>
-              <a:schemeClr val="bg1"/>
-            </a:solidFill>
-          </a:ln>
-        </p:spPr>
-        <p:style>
-          <a:lnRef idx="2">
-            <a:schemeClr val="accent1">
-              <a:shade val="50000"/>
-            </a:schemeClr>
-          </a:lnRef>
-          <a:fillRef idx="1">
-            <a:schemeClr val="accent1"/>
-          </a:fillRef>
-          <a:effectRef idx="0">
-            <a:schemeClr val="accent1"/>
-          </a:effectRef>
-          <a:fontRef idx="minor">
-            <a:schemeClr val="lt1"/>
-          </a:fontRef>
-        </p:style>
-        <p:txBody>
-          <a:bodyPr rtlCol="0" anchor="ctr"/>
-          <a:lstStyle/>
-          <a:p>
-            <a:pPr algn="ctr"/>
-            <a:r>
-              <a:rPr lang="en-US" altLang="ko-KR" sz="800" dirty="0" smtClean="0">
-                <a:solidFill>
-                  <a:schemeClr val="bg1"/>
-                </a:solidFill>
-              </a:rPr>
-              <a:t>mail</a:t>
-            </a:r>
-          </a:p>
-          <a:p>
-            <a:pPr algn="ctr"/>
-            <a:r>
-              <a:rPr lang="en-US" altLang="ko-KR" sz="800" dirty="0" smtClean="0">
-                <a:solidFill>
-                  <a:schemeClr val="bg1"/>
-                </a:solidFill>
-              </a:rPr>
-              <a:t>box</a:t>
-            </a:r>
-            <a:endParaRPr lang="ko-KR" altLang="en-US" sz="800" dirty="0">
-              <a:solidFill>
-                <a:schemeClr val="bg1"/>
-              </a:solidFill>
-            </a:endParaRPr>
-          </a:p>
-        </p:txBody>
-      </p:sp>
       <p:cxnSp>
         <p:nvCxnSpPr>
           <p:cNvPr id="106" name="직선 화살표 연결선 105"/>
@@ -3993,41 +3766,8 @@
         </p:nvCxnSpPr>
         <p:spPr>
           <a:xfrm flipH="1">
-            <a:off x="2627784" y="5157192"/>
-            <a:ext cx="1224136" cy="648072"/>
-          </a:xfrm>
-          <a:prstGeom prst="straightConnector1">
-            <a:avLst/>
-          </a:prstGeom>
-          <a:ln>
-            <a:tailEnd type="arrow"/>
-          </a:ln>
-        </p:spPr>
-        <p:style>
-          <a:lnRef idx="1">
-            <a:schemeClr val="accent1"/>
-          </a:lnRef>
-          <a:fillRef idx="0">
-            <a:schemeClr val="accent1"/>
-          </a:fillRef>
-          <a:effectRef idx="0">
-            <a:schemeClr val="accent1"/>
-          </a:effectRef>
-          <a:fontRef idx="minor">
-            <a:schemeClr val="tx1"/>
-          </a:fontRef>
-        </p:style>
-      </p:cxnSp>
-      <p:cxnSp>
-        <p:nvCxnSpPr>
-          <p:cNvPr id="108" name="직선 화살표 연결선 107"/>
-          <p:cNvCxnSpPr/>
-          <p:nvPr/>
-        </p:nvCxnSpPr>
-        <p:spPr>
-          <a:xfrm flipV="1">
-            <a:off x="2915816" y="5157192"/>
-            <a:ext cx="1080120" cy="648072"/>
+            <a:off x="3846734" y="5164832"/>
+            <a:ext cx="265002" cy="638180"/>
           </a:xfrm>
           <a:prstGeom prst="straightConnector1">
             <a:avLst/>
@@ -4054,46 +3794,15 @@
       <p:cxnSp>
         <p:nvCxnSpPr>
           <p:cNvPr id="114" name="직선 화살표 연결선 113"/>
-          <p:cNvCxnSpPr/>
+          <p:cNvCxnSpPr>
+            <a:endCxn id="27" idx="2"/>
+          </p:cNvCxnSpPr>
           <p:nvPr/>
         </p:nvCxnSpPr>
         <p:spPr>
-          <a:xfrm flipV="1">
-            <a:off x="3491880" y="5157192"/>
-            <a:ext cx="720080" cy="648072"/>
-          </a:xfrm>
-          <a:prstGeom prst="straightConnector1">
-            <a:avLst/>
-          </a:prstGeom>
-          <a:ln>
-            <a:tailEnd type="arrow"/>
-          </a:ln>
-        </p:spPr>
-        <p:style>
-          <a:lnRef idx="1">
-            <a:schemeClr val="accent1"/>
-          </a:lnRef>
-          <a:fillRef idx="0">
-            <a:schemeClr val="accent1"/>
-          </a:fillRef>
-          <a:effectRef idx="0">
-            <a:schemeClr val="accent1"/>
-          </a:effectRef>
-          <a:fontRef idx="minor">
-            <a:schemeClr val="tx1"/>
-          </a:fontRef>
-        </p:style>
-      </p:cxnSp>
-      <p:cxnSp>
-        <p:nvCxnSpPr>
-          <p:cNvPr id="116" name="직선 화살표 연결선 115"/>
-          <p:cNvCxnSpPr/>
-          <p:nvPr/>
-        </p:nvCxnSpPr>
-        <p:spPr>
-          <a:xfrm flipH="1">
-            <a:off x="3275856" y="5157192"/>
-            <a:ext cx="792088" cy="648072"/>
+          <a:xfrm flipH="1" flipV="1">
+            <a:off x="4572000" y="5157192"/>
+            <a:ext cx="1" cy="645820"/>
           </a:xfrm>
           <a:prstGeom prst="straightConnector1">
             <a:avLst/>
@@ -4124,9 +3833,9 @@
           <p:nvPr/>
         </p:nvCxnSpPr>
         <p:spPr>
-          <a:xfrm flipH="1">
-            <a:off x="3851920" y="5157192"/>
-            <a:ext cx="504056" cy="648072"/>
+          <a:xfrm>
+            <a:off x="4896036" y="5157192"/>
+            <a:ext cx="270012" cy="645820"/>
           </a:xfrm>
           <a:prstGeom prst="straightConnector1">
             <a:avLst/>
@@ -4159,282 +3868,9 @@
           <p:nvPr/>
         </p:nvCxnSpPr>
         <p:spPr>
-          <a:xfrm flipV="1">
-            <a:off x="4031940" y="5157192"/>
-            <a:ext cx="396044" cy="648072"/>
-          </a:xfrm>
-          <a:prstGeom prst="straightConnector1">
-            <a:avLst/>
-          </a:prstGeom>
-          <a:ln>
-            <a:tailEnd type="arrow"/>
-          </a:ln>
-        </p:spPr>
-        <p:style>
-          <a:lnRef idx="1">
-            <a:schemeClr val="accent1"/>
-          </a:lnRef>
-          <a:fillRef idx="0">
-            <a:schemeClr val="accent1"/>
-          </a:fillRef>
-          <a:effectRef idx="0">
-            <a:schemeClr val="accent1"/>
-          </a:effectRef>
-          <a:fontRef idx="minor">
-            <a:schemeClr val="tx1"/>
-          </a:fontRef>
-        </p:style>
-      </p:cxnSp>
-      <p:cxnSp>
-        <p:nvCxnSpPr>
-          <p:cNvPr id="125" name="직선 화살표 연결선 124"/>
-          <p:cNvCxnSpPr>
-            <a:endCxn id="102" idx="0"/>
-          </p:cNvCxnSpPr>
-          <p:nvPr/>
-        </p:nvCxnSpPr>
-        <p:spPr>
-          <a:xfrm>
-            <a:off x="4572000" y="5157192"/>
-            <a:ext cx="36004" cy="648072"/>
-          </a:xfrm>
-          <a:prstGeom prst="straightConnector1">
-            <a:avLst/>
-          </a:prstGeom>
-          <a:ln>
-            <a:tailEnd type="arrow"/>
-          </a:ln>
-        </p:spPr>
-        <p:style>
-          <a:lnRef idx="1">
-            <a:schemeClr val="accent1"/>
-          </a:lnRef>
-          <a:fillRef idx="0">
-            <a:schemeClr val="accent1"/>
-          </a:fillRef>
-          <a:effectRef idx="0">
-            <a:schemeClr val="accent1"/>
-          </a:effectRef>
-          <a:fontRef idx="minor">
-            <a:schemeClr val="tx1"/>
-          </a:fontRef>
-        </p:style>
-      </p:cxnSp>
-      <p:cxnSp>
-        <p:nvCxnSpPr>
-          <p:cNvPr id="128" name="직선 화살표 연결선 127"/>
-          <p:cNvCxnSpPr/>
-          <p:nvPr/>
-        </p:nvCxnSpPr>
-        <p:spPr>
-          <a:xfrm>
-            <a:off x="4788024" y="5157192"/>
-            <a:ext cx="216024" cy="648072"/>
-          </a:xfrm>
-          <a:prstGeom prst="straightConnector1">
-            <a:avLst/>
-          </a:prstGeom>
-          <a:ln>
-            <a:tailEnd type="arrow"/>
-          </a:ln>
-        </p:spPr>
-        <p:style>
-          <a:lnRef idx="1">
-            <a:schemeClr val="accent1"/>
-          </a:lnRef>
-          <a:fillRef idx="0">
-            <a:schemeClr val="accent1"/>
-          </a:fillRef>
-          <a:effectRef idx="0">
-            <a:schemeClr val="accent1"/>
-          </a:effectRef>
-          <a:fontRef idx="minor">
-            <a:schemeClr val="tx1"/>
-          </a:fontRef>
-        </p:style>
-      </p:cxnSp>
-      <p:cxnSp>
-        <p:nvCxnSpPr>
-          <p:cNvPr id="131" name="직선 화살표 연결선 130"/>
-          <p:cNvCxnSpPr/>
-          <p:nvPr/>
-        </p:nvCxnSpPr>
-        <p:spPr>
-          <a:xfrm>
+          <a:xfrm flipH="1" flipV="1">
             <a:off x="5004048" y="5157192"/>
-            <a:ext cx="576064" cy="648072"/>
-          </a:xfrm>
-          <a:prstGeom prst="straightConnector1">
-            <a:avLst/>
-          </a:prstGeom>
-          <a:ln>
-            <a:tailEnd type="arrow"/>
-          </a:ln>
-        </p:spPr>
-        <p:style>
-          <a:lnRef idx="1">
-            <a:schemeClr val="accent1"/>
-          </a:lnRef>
-          <a:fillRef idx="0">
-            <a:schemeClr val="accent1"/>
-          </a:fillRef>
-          <a:effectRef idx="0">
-            <a:schemeClr val="accent1"/>
-          </a:effectRef>
-          <a:fontRef idx="minor">
-            <a:schemeClr val="tx1"/>
-          </a:fontRef>
-        </p:style>
-      </p:cxnSp>
-      <p:cxnSp>
-        <p:nvCxnSpPr>
-          <p:cNvPr id="137" name="직선 화살표 연결선 136"/>
-          <p:cNvCxnSpPr/>
-          <p:nvPr/>
-        </p:nvCxnSpPr>
-        <p:spPr>
-          <a:xfrm flipH="1" flipV="1">
-            <a:off x="4644008" y="5157192"/>
-            <a:ext cx="72008" cy="648072"/>
-          </a:xfrm>
-          <a:prstGeom prst="straightConnector1">
-            <a:avLst/>
-          </a:prstGeom>
-          <a:ln>
-            <a:tailEnd type="arrow"/>
-          </a:ln>
-        </p:spPr>
-        <p:style>
-          <a:lnRef idx="1">
-            <a:schemeClr val="accent1"/>
-          </a:lnRef>
-          <a:fillRef idx="0">
-            <a:schemeClr val="accent1"/>
-          </a:fillRef>
-          <a:effectRef idx="0">
-            <a:schemeClr val="accent1"/>
-          </a:effectRef>
-          <a:fontRef idx="minor">
-            <a:schemeClr val="tx1"/>
-          </a:fontRef>
-        </p:style>
-      </p:cxnSp>
-      <p:cxnSp>
-        <p:nvCxnSpPr>
-          <p:cNvPr id="146" name="직선 화살표 연결선 145"/>
-          <p:cNvCxnSpPr>
-            <a:stCxn id="103" idx="0"/>
-          </p:cNvCxnSpPr>
-          <p:nvPr/>
-        </p:nvCxnSpPr>
-        <p:spPr>
-          <a:xfrm flipH="1" flipV="1">
-            <a:off x="4932040" y="5157192"/>
-            <a:ext cx="252028" cy="648072"/>
-          </a:xfrm>
-          <a:prstGeom prst="straightConnector1">
-            <a:avLst/>
-          </a:prstGeom>
-          <a:ln>
-            <a:tailEnd type="arrow"/>
-          </a:ln>
-        </p:spPr>
-        <p:style>
-          <a:lnRef idx="1">
-            <a:schemeClr val="accent1"/>
-          </a:lnRef>
-          <a:fillRef idx="0">
-            <a:schemeClr val="accent1"/>
-          </a:fillRef>
-          <a:effectRef idx="0">
-            <a:schemeClr val="accent1"/>
-          </a:effectRef>
-          <a:fontRef idx="minor">
-            <a:schemeClr val="tx1"/>
-          </a:fontRef>
-        </p:style>
-      </p:cxnSp>
-      <p:cxnSp>
-        <p:nvCxnSpPr>
-          <p:cNvPr id="150" name="직선 화살표 연결선 149"/>
-          <p:cNvCxnSpPr>
-            <a:stCxn id="104" idx="0"/>
-          </p:cNvCxnSpPr>
-          <p:nvPr/>
-        </p:nvCxnSpPr>
-        <p:spPr>
-          <a:xfrm flipH="1" flipV="1">
-            <a:off x="5220072" y="5157192"/>
-            <a:ext cx="540060" cy="648072"/>
-          </a:xfrm>
-          <a:prstGeom prst="straightConnector1">
-            <a:avLst/>
-          </a:prstGeom>
-          <a:ln>
-            <a:tailEnd type="arrow"/>
-          </a:ln>
-        </p:spPr>
-        <p:style>
-          <a:lnRef idx="1">
-            <a:schemeClr val="accent1"/>
-          </a:lnRef>
-          <a:fillRef idx="0">
-            <a:schemeClr val="accent1"/>
-          </a:fillRef>
-          <a:effectRef idx="0">
-            <a:schemeClr val="accent1"/>
-          </a:effectRef>
-          <a:fontRef idx="minor">
-            <a:schemeClr val="tx1"/>
-          </a:fontRef>
-        </p:style>
-      </p:cxnSp>
-      <p:cxnSp>
-        <p:nvCxnSpPr>
-          <p:cNvPr id="153" name="직선 화살표 연결선 152"/>
-          <p:cNvCxnSpPr>
-            <a:stCxn id="105" idx="0"/>
-            <a:endCxn id="27" idx="3"/>
-          </p:cNvCxnSpPr>
-          <p:nvPr/>
-        </p:nvCxnSpPr>
-        <p:spPr>
-          <a:xfrm flipH="1" flipV="1">
-            <a:off x="5400092" y="4941168"/>
-            <a:ext cx="936104" cy="864096"/>
-          </a:xfrm>
-          <a:prstGeom prst="straightConnector1">
-            <a:avLst/>
-          </a:prstGeom>
-          <a:ln>
-            <a:tailEnd type="arrow"/>
-          </a:ln>
-        </p:spPr>
-        <p:style>
-          <a:lnRef idx="1">
-            <a:schemeClr val="accent1"/>
-          </a:lnRef>
-          <a:fillRef idx="0">
-            <a:schemeClr val="accent1"/>
-          </a:fillRef>
-          <a:effectRef idx="0">
-            <a:schemeClr val="accent1"/>
-          </a:effectRef>
-          <a:fontRef idx="minor">
-            <a:schemeClr val="tx1"/>
-          </a:fontRef>
-        </p:style>
-      </p:cxnSp>
-      <p:cxnSp>
-        <p:nvCxnSpPr>
-          <p:cNvPr id="159" name="직선 화살표 연결선 158"/>
-          <p:cNvCxnSpPr/>
-          <p:nvPr/>
-        </p:nvCxnSpPr>
-        <p:spPr>
-          <a:xfrm>
-            <a:off x="5364088" y="5085184"/>
-            <a:ext cx="864096" cy="720080"/>
+            <a:ext cx="262224" cy="645820"/>
           </a:xfrm>
           <a:prstGeom prst="straightConnector1">
             <a:avLst/>
@@ -4461,7 +3897,7 @@
     </p:spTree>
     <p:extLst>
       <p:ext uri="{BB962C8B-B14F-4D97-AF65-F5344CB8AC3E}">
-        <p14:creationId xmlns:p14="http://schemas.microsoft.com/office/powerpoint/2010/main" xmlns="" val="1933598799"/>
+        <p14:creationId xmlns:p14="http://schemas.microsoft.com/office/powerpoint/2010/main" val="1933598799"/>
       </p:ext>
     </p:extLst>
   </p:cSld>
@@ -5213,82 +4649,14 @@
       </p:sp>
       <p:sp>
         <p:nvSpPr>
-          <p:cNvPr id="27" name="직사각형 26"/>
-          <p:cNvSpPr/>
-          <p:nvPr/>
-        </p:nvSpPr>
-        <p:spPr>
-          <a:xfrm>
-            <a:off x="3707904" y="4365104"/>
-            <a:ext cx="1728192" cy="432048"/>
-          </a:xfrm>
-          <a:prstGeom prst="rect">
-            <a:avLst/>
-          </a:prstGeom>
-          <a:solidFill>
-            <a:srgbClr val="92D050"/>
-          </a:solidFill>
-          <a:ln w="6350">
-            <a:solidFill>
-              <a:schemeClr val="bg1"/>
-            </a:solidFill>
-          </a:ln>
-        </p:spPr>
-        <p:style>
-          <a:lnRef idx="2">
-            <a:schemeClr val="accent1">
-              <a:shade val="50000"/>
-            </a:schemeClr>
-          </a:lnRef>
-          <a:fillRef idx="1">
-            <a:schemeClr val="accent1"/>
-          </a:fillRef>
-          <a:effectRef idx="0">
-            <a:schemeClr val="accent1"/>
-          </a:effectRef>
-          <a:fontRef idx="minor">
-            <a:schemeClr val="lt1"/>
-          </a:fontRef>
-        </p:style>
-        <p:txBody>
-          <a:bodyPr rtlCol="0" anchor="ctr"/>
-          <a:lstStyle/>
-          <a:p>
-            <a:pPr algn="ctr"/>
-            <a:r>
-              <a:rPr lang="en-US" altLang="ko-KR" sz="1000" dirty="0" smtClean="0">
-                <a:solidFill>
-                  <a:schemeClr val="bg1"/>
-                </a:solidFill>
-              </a:rPr>
-              <a:t>N</a:t>
-            </a:r>
-            <a:r>
-              <a:rPr lang="en-US" altLang="ko-KR" sz="1000" dirty="0" smtClean="0">
-                <a:solidFill>
-                  <a:schemeClr val="bg1"/>
-                </a:solidFill>
-              </a:rPr>
-              <a:t>ode</a:t>
-            </a:r>
-            <a:endParaRPr lang="en-US" altLang="ko-KR" sz="1000" dirty="0" smtClean="0">
-              <a:solidFill>
-                <a:schemeClr val="bg1"/>
-              </a:solidFill>
-            </a:endParaRPr>
-          </a:p>
-        </p:txBody>
-      </p:sp>
-      <p:sp>
-        <p:nvSpPr>
           <p:cNvPr id="45" name="직사각형 44"/>
           <p:cNvSpPr/>
           <p:nvPr/>
         </p:nvSpPr>
         <p:spPr>
           <a:xfrm>
-            <a:off x="2483768" y="4941168"/>
-            <a:ext cx="4176464" cy="1080120"/>
+            <a:off x="3161494" y="4941168"/>
+            <a:ext cx="2850666" cy="1080120"/>
           </a:xfrm>
           <a:prstGeom prst="rect">
             <a:avLst/>
@@ -5542,491 +4910,7 @@
                   <a:schemeClr val="bg1"/>
                 </a:solidFill>
               </a:rPr>
-              <a:t>: </a:t>
-            </a:r>
-            <a:r>
-              <a:rPr lang="en-US" altLang="ko-KR" sz="800" dirty="0" smtClean="0">
-                <a:solidFill>
-                  <a:schemeClr val="bg1"/>
-                </a:solidFill>
-              </a:rPr>
-              <a:t> information</a:t>
-            </a:r>
-            <a:r>
-              <a:rPr lang="en-US" altLang="ko-KR" sz="800" dirty="0" smtClean="0">
-                <a:solidFill>
-                  <a:schemeClr val="bg1"/>
-                </a:solidFill>
-              </a:rPr>
-              <a:t>, from A to B</a:t>
-            </a:r>
-            <a:endParaRPr lang="ko-KR" altLang="en-US" sz="800" dirty="0">
-              <a:solidFill>
-                <a:schemeClr val="bg1"/>
-              </a:solidFill>
-            </a:endParaRPr>
-          </a:p>
-        </p:txBody>
-      </p:sp>
-      <p:sp>
-        <p:nvSpPr>
-          <p:cNvPr id="98" name="직사각형 97"/>
-          <p:cNvSpPr/>
-          <p:nvPr/>
-        </p:nvSpPr>
-        <p:spPr>
-          <a:xfrm>
-            <a:off x="2555776" y="5445224"/>
-            <a:ext cx="504056" cy="360040"/>
-          </a:xfrm>
-          <a:prstGeom prst="rect">
-            <a:avLst/>
-          </a:prstGeom>
-          <a:solidFill>
-            <a:srgbClr val="FFC000"/>
-          </a:solidFill>
-          <a:ln w="6350">
-            <a:solidFill>
-              <a:schemeClr val="bg1"/>
-            </a:solidFill>
-          </a:ln>
-        </p:spPr>
-        <p:style>
-          <a:lnRef idx="2">
-            <a:schemeClr val="accent1">
-              <a:shade val="50000"/>
-            </a:schemeClr>
-          </a:lnRef>
-          <a:fillRef idx="1">
-            <a:schemeClr val="accent1"/>
-          </a:fillRef>
-          <a:effectRef idx="0">
-            <a:schemeClr val="accent1"/>
-          </a:effectRef>
-          <a:fontRef idx="minor">
-            <a:schemeClr val="lt1"/>
-          </a:fontRef>
-        </p:style>
-        <p:txBody>
-          <a:bodyPr rtlCol="0" anchor="ctr"/>
-          <a:lstStyle/>
-          <a:p>
-            <a:pPr algn="ctr"/>
-            <a:r>
-              <a:rPr lang="en-US" altLang="ko-KR" sz="1000" dirty="0" smtClean="0">
-                <a:solidFill>
-                  <a:schemeClr val="bg1"/>
-                </a:solidFill>
-              </a:rPr>
-              <a:t>door</a:t>
-            </a:r>
-            <a:endParaRPr lang="ko-KR" altLang="en-US" sz="1000" dirty="0">
-              <a:solidFill>
-                <a:schemeClr val="bg1"/>
-              </a:solidFill>
-            </a:endParaRPr>
-          </a:p>
-        </p:txBody>
-      </p:sp>
-      <p:sp>
-        <p:nvSpPr>
-          <p:cNvPr id="99" name="직사각형 98"/>
-          <p:cNvSpPr/>
-          <p:nvPr/>
-        </p:nvSpPr>
-        <p:spPr>
-          <a:xfrm>
-            <a:off x="3131840" y="5445224"/>
-            <a:ext cx="576064" cy="360040"/>
-          </a:xfrm>
-          <a:prstGeom prst="rect">
-            <a:avLst/>
-          </a:prstGeom>
-          <a:solidFill>
-            <a:srgbClr val="FFC000"/>
-          </a:solidFill>
-          <a:ln w="6350">
-            <a:solidFill>
-              <a:schemeClr val="bg1"/>
-            </a:solidFill>
-          </a:ln>
-        </p:spPr>
-        <p:style>
-          <a:lnRef idx="2">
-            <a:schemeClr val="accent1">
-              <a:shade val="50000"/>
-            </a:schemeClr>
-          </a:lnRef>
-          <a:fillRef idx="1">
-            <a:schemeClr val="accent1"/>
-          </a:fillRef>
-          <a:effectRef idx="0">
-            <a:schemeClr val="accent1"/>
-          </a:effectRef>
-          <a:fontRef idx="minor">
-            <a:schemeClr val="lt1"/>
-          </a:fontRef>
-        </p:style>
-        <p:txBody>
-          <a:bodyPr rtlCol="0" anchor="ctr"/>
-          <a:lstStyle/>
-          <a:p>
-            <a:pPr algn="ctr"/>
-            <a:r>
-              <a:rPr lang="en-US" altLang="ko-KR" sz="800" dirty="0" smtClean="0">
-                <a:solidFill>
-                  <a:schemeClr val="bg1"/>
-                </a:solidFill>
-              </a:rPr>
-              <a:t>door</a:t>
-            </a:r>
-          </a:p>
-          <a:p>
-            <a:pPr algn="ctr"/>
-            <a:r>
-              <a:rPr lang="en-US" altLang="ko-KR" sz="800" dirty="0" smtClean="0">
-                <a:solidFill>
-                  <a:schemeClr val="bg1"/>
-                </a:solidFill>
-              </a:rPr>
-              <a:t>sensor</a:t>
-            </a:r>
-            <a:endParaRPr lang="ko-KR" altLang="en-US" sz="800" dirty="0">
-              <a:solidFill>
-                <a:schemeClr val="bg1"/>
-              </a:solidFill>
-            </a:endParaRPr>
-          </a:p>
-        </p:txBody>
-      </p:sp>
-      <p:sp>
-        <p:nvSpPr>
-          <p:cNvPr id="100" name="직사각형 99"/>
-          <p:cNvSpPr/>
-          <p:nvPr/>
-        </p:nvSpPr>
-        <p:spPr>
-          <a:xfrm>
-            <a:off x="3779912" y="5445224"/>
-            <a:ext cx="504056" cy="360040"/>
-          </a:xfrm>
-          <a:prstGeom prst="rect">
-            <a:avLst/>
-          </a:prstGeom>
-          <a:solidFill>
-            <a:srgbClr val="FFC000"/>
-          </a:solidFill>
-          <a:ln w="6350">
-            <a:solidFill>
-              <a:schemeClr val="bg1"/>
-            </a:solidFill>
-          </a:ln>
-        </p:spPr>
-        <p:style>
-          <a:lnRef idx="2">
-            <a:schemeClr val="accent1">
-              <a:shade val="50000"/>
-            </a:schemeClr>
-          </a:lnRef>
-          <a:fillRef idx="1">
-            <a:schemeClr val="accent1"/>
-          </a:fillRef>
-          <a:effectRef idx="0">
-            <a:schemeClr val="accent1"/>
-          </a:effectRef>
-          <a:fontRef idx="minor">
-            <a:schemeClr val="lt1"/>
-          </a:fontRef>
-        </p:style>
-        <p:txBody>
-          <a:bodyPr rtlCol="0" anchor="ctr"/>
-          <a:lstStyle/>
-          <a:p>
-            <a:pPr algn="ctr"/>
-            <a:r>
-              <a:rPr lang="en-US" altLang="ko-KR" sz="800" dirty="0" smtClean="0">
-                <a:solidFill>
-                  <a:schemeClr val="bg1"/>
-                </a:solidFill>
-              </a:rPr>
-              <a:t>alarm</a:t>
-            </a:r>
-            <a:endParaRPr lang="ko-KR" altLang="en-US" sz="800" dirty="0">
-              <a:solidFill>
-                <a:schemeClr val="bg1"/>
-              </a:solidFill>
-            </a:endParaRPr>
-          </a:p>
-        </p:txBody>
-      </p:sp>
-      <p:sp>
-        <p:nvSpPr>
-          <p:cNvPr id="102" name="직사각형 101"/>
-          <p:cNvSpPr/>
-          <p:nvPr/>
-        </p:nvSpPr>
-        <p:spPr>
-          <a:xfrm>
-            <a:off x="4355976" y="5445224"/>
-            <a:ext cx="504056" cy="360040"/>
-          </a:xfrm>
-          <a:prstGeom prst="rect">
-            <a:avLst/>
-          </a:prstGeom>
-          <a:solidFill>
-            <a:srgbClr val="FFC000"/>
-          </a:solidFill>
-          <a:ln w="6350">
-            <a:solidFill>
-              <a:schemeClr val="bg1"/>
-            </a:solidFill>
-          </a:ln>
-        </p:spPr>
-        <p:style>
-          <a:lnRef idx="2">
-            <a:schemeClr val="accent1">
-              <a:shade val="50000"/>
-            </a:schemeClr>
-          </a:lnRef>
-          <a:fillRef idx="1">
-            <a:schemeClr val="accent1"/>
-          </a:fillRef>
-          <a:effectRef idx="0">
-            <a:schemeClr val="accent1"/>
-          </a:effectRef>
-          <a:fontRef idx="minor">
-            <a:schemeClr val="lt1"/>
-          </a:fontRef>
-        </p:style>
-        <p:txBody>
-          <a:bodyPr rtlCol="0" anchor="ctr"/>
-          <a:lstStyle/>
-          <a:p>
-            <a:pPr algn="ctr"/>
-            <a:r>
-              <a:rPr lang="en-US" altLang="ko-KR" sz="800" dirty="0" smtClean="0">
-                <a:solidFill>
-                  <a:schemeClr val="bg1"/>
-                </a:solidFill>
-              </a:rPr>
-              <a:t>light</a:t>
-            </a:r>
-            <a:endParaRPr lang="ko-KR" altLang="en-US" sz="800" dirty="0">
-              <a:solidFill>
-                <a:schemeClr val="bg1"/>
-              </a:solidFill>
-            </a:endParaRPr>
-          </a:p>
-        </p:txBody>
-      </p:sp>
-      <p:sp>
-        <p:nvSpPr>
-          <p:cNvPr id="103" name="직사각형 102"/>
-          <p:cNvSpPr/>
-          <p:nvPr/>
-        </p:nvSpPr>
-        <p:spPr>
-          <a:xfrm>
-            <a:off x="4932040" y="5445224"/>
-            <a:ext cx="504056" cy="360040"/>
-          </a:xfrm>
-          <a:prstGeom prst="rect">
-            <a:avLst/>
-          </a:prstGeom>
-          <a:solidFill>
-            <a:srgbClr val="FFC000"/>
-          </a:solidFill>
-          <a:ln w="6350">
-            <a:solidFill>
-              <a:schemeClr val="bg1"/>
-            </a:solidFill>
-          </a:ln>
-        </p:spPr>
-        <p:style>
-          <a:lnRef idx="2">
-            <a:schemeClr val="accent1">
-              <a:shade val="50000"/>
-            </a:schemeClr>
-          </a:lnRef>
-          <a:fillRef idx="1">
-            <a:schemeClr val="accent1"/>
-          </a:fillRef>
-          <a:effectRef idx="0">
-            <a:schemeClr val="accent1"/>
-          </a:effectRef>
-          <a:fontRef idx="minor">
-            <a:schemeClr val="lt1"/>
-          </a:fontRef>
-        </p:style>
-        <p:txBody>
-          <a:bodyPr rtlCol="0" anchor="ctr"/>
-          <a:lstStyle/>
-          <a:p>
-            <a:pPr algn="ctr"/>
-            <a:r>
-              <a:rPr lang="en-US" altLang="ko-KR" sz="800" dirty="0" smtClean="0">
-                <a:solidFill>
-                  <a:schemeClr val="bg1"/>
-                </a:solidFill>
-              </a:rPr>
-              <a:t>temp</a:t>
-            </a:r>
-          </a:p>
-          <a:p>
-            <a:pPr algn="ctr"/>
-            <a:r>
-              <a:rPr lang="en-US" altLang="ko-KR" sz="800" dirty="0" smtClean="0">
-                <a:solidFill>
-                  <a:schemeClr val="bg1"/>
-                </a:solidFill>
-              </a:rPr>
-              <a:t>sensor</a:t>
-            </a:r>
-            <a:endParaRPr lang="ko-KR" altLang="en-US" sz="800" dirty="0">
-              <a:solidFill>
-                <a:schemeClr val="bg1"/>
-              </a:solidFill>
-            </a:endParaRPr>
-          </a:p>
-        </p:txBody>
-      </p:sp>
-      <p:sp>
-        <p:nvSpPr>
-          <p:cNvPr id="104" name="직사각형 103"/>
-          <p:cNvSpPr/>
-          <p:nvPr/>
-        </p:nvSpPr>
-        <p:spPr>
-          <a:xfrm>
-            <a:off x="5508104" y="5445224"/>
-            <a:ext cx="504056" cy="360040"/>
-          </a:xfrm>
-          <a:prstGeom prst="rect">
-            <a:avLst/>
-          </a:prstGeom>
-          <a:solidFill>
-            <a:srgbClr val="FFC000"/>
-          </a:solidFill>
-          <a:ln w="6350">
-            <a:solidFill>
-              <a:schemeClr val="bg1"/>
-            </a:solidFill>
-          </a:ln>
-        </p:spPr>
-        <p:style>
-          <a:lnRef idx="2">
-            <a:schemeClr val="accent1">
-              <a:shade val="50000"/>
-            </a:schemeClr>
-          </a:lnRef>
-          <a:fillRef idx="1">
-            <a:schemeClr val="accent1"/>
-          </a:fillRef>
-          <a:effectRef idx="0">
-            <a:schemeClr val="accent1"/>
-          </a:effectRef>
-          <a:fontRef idx="minor">
-            <a:schemeClr val="lt1"/>
-          </a:fontRef>
-        </p:style>
-        <p:txBody>
-          <a:bodyPr rtlCol="0" anchor="ctr"/>
-          <a:lstStyle/>
-          <a:p>
-            <a:pPr algn="ctr"/>
-            <a:r>
-              <a:rPr lang="en-US" altLang="ko-KR" sz="800" dirty="0" smtClean="0">
-                <a:solidFill>
-                  <a:schemeClr val="bg1"/>
-                </a:solidFill>
-              </a:rPr>
-              <a:t>hum</a:t>
-            </a:r>
-            <a:br>
-              <a:rPr lang="en-US" altLang="ko-KR" sz="800" dirty="0" smtClean="0">
-                <a:solidFill>
-                  <a:schemeClr val="bg1"/>
-                </a:solidFill>
-              </a:rPr>
-            </a:br>
-            <a:r>
-              <a:rPr lang="en-US" altLang="ko-KR" sz="800" dirty="0" smtClean="0">
-                <a:solidFill>
-                  <a:schemeClr val="bg1"/>
-                </a:solidFill>
-              </a:rPr>
-              <a:t>sensor</a:t>
-            </a:r>
-            <a:endParaRPr lang="ko-KR" altLang="en-US" sz="800" dirty="0">
-              <a:solidFill>
-                <a:schemeClr val="bg1"/>
-              </a:solidFill>
-            </a:endParaRPr>
-          </a:p>
-        </p:txBody>
-      </p:sp>
-      <p:sp>
-        <p:nvSpPr>
-          <p:cNvPr id="105" name="직사각형 104"/>
-          <p:cNvSpPr/>
-          <p:nvPr/>
-        </p:nvSpPr>
-        <p:spPr>
-          <a:xfrm>
-            <a:off x="6084168" y="5445224"/>
-            <a:ext cx="504056" cy="360040"/>
-          </a:xfrm>
-          <a:prstGeom prst="rect">
-            <a:avLst/>
-          </a:prstGeom>
-          <a:solidFill>
-            <a:srgbClr val="FFC000"/>
-          </a:solidFill>
-          <a:ln w="6350">
-            <a:solidFill>
-              <a:schemeClr val="bg1"/>
-            </a:solidFill>
-          </a:ln>
-        </p:spPr>
-        <p:style>
-          <a:lnRef idx="2">
-            <a:schemeClr val="accent1">
-              <a:shade val="50000"/>
-            </a:schemeClr>
-          </a:lnRef>
-          <a:fillRef idx="1">
-            <a:schemeClr val="accent1"/>
-          </a:fillRef>
-          <a:effectRef idx="0">
-            <a:schemeClr val="accent1"/>
-          </a:effectRef>
-          <a:fontRef idx="minor">
-            <a:schemeClr val="lt1"/>
-          </a:fontRef>
-        </p:style>
-        <p:txBody>
-          <a:bodyPr rtlCol="0" anchor="ctr"/>
-          <a:lstStyle/>
-          <a:p>
-            <a:pPr algn="ctr"/>
-            <a:r>
-              <a:rPr lang="en-US" altLang="ko-KR" sz="800" dirty="0" smtClean="0">
-                <a:solidFill>
-                  <a:schemeClr val="bg1"/>
-                </a:solidFill>
-              </a:rPr>
-              <a:t>mail</a:t>
-            </a:r>
-          </a:p>
-          <a:p>
-            <a:pPr algn="ctr"/>
-            <a:r>
-              <a:rPr lang="en-US" altLang="ko-KR" sz="800" dirty="0" smtClean="0">
-                <a:solidFill>
-                  <a:schemeClr val="bg1"/>
-                </a:solidFill>
-              </a:rPr>
-              <a:t>box</a:t>
+              <a:t>:  information, from A to B</a:t>
             </a:r>
             <a:endParaRPr lang="ko-KR" altLang="en-US" sz="800" dirty="0">
               <a:solidFill>
@@ -7778,7 +6662,7 @@
         </p:nvSpPr>
         <p:spPr>
           <a:xfrm>
-            <a:off x="3419872" y="5445224"/>
+            <a:off x="3521534" y="5445224"/>
             <a:ext cx="72008" cy="72008"/>
           </a:xfrm>
           <a:prstGeom prst="rect">
@@ -7910,7 +6794,7 @@
         </p:nvSpPr>
         <p:spPr>
           <a:xfrm>
-            <a:off x="3347864" y="5445224"/>
+            <a:off x="3449526" y="5445224"/>
             <a:ext cx="72008" cy="72008"/>
           </a:xfrm>
           <a:prstGeom prst="rect">
@@ -7954,7 +6838,7 @@
         </p:nvSpPr>
         <p:spPr>
           <a:xfrm>
-            <a:off x="4067944" y="5445224"/>
+            <a:off x="4169606" y="5445224"/>
             <a:ext cx="72008" cy="72008"/>
           </a:xfrm>
           <a:prstGeom prst="rect">
@@ -8086,7 +6970,7 @@
         </p:nvSpPr>
         <p:spPr>
           <a:xfrm>
-            <a:off x="3995936" y="5445224"/>
+            <a:off x="4097598" y="5445224"/>
             <a:ext cx="72008" cy="72008"/>
           </a:xfrm>
           <a:prstGeom prst="rect">
@@ -8130,7 +7014,7 @@
         </p:nvSpPr>
         <p:spPr>
           <a:xfrm>
-            <a:off x="4572000" y="5445224"/>
+            <a:off x="4673662" y="5445224"/>
             <a:ext cx="72008" cy="72008"/>
           </a:xfrm>
           <a:prstGeom prst="rect">
@@ -8262,7 +7146,7 @@
         </p:nvSpPr>
         <p:spPr>
           <a:xfrm>
-            <a:off x="4499992" y="5445224"/>
+            <a:off x="4601654" y="5445224"/>
             <a:ext cx="72008" cy="72008"/>
           </a:xfrm>
           <a:prstGeom prst="rect">
@@ -8306,7 +7190,7 @@
         </p:nvSpPr>
         <p:spPr>
           <a:xfrm>
-            <a:off x="5148064" y="5445224"/>
+            <a:off x="5249726" y="5445224"/>
             <a:ext cx="72008" cy="72008"/>
           </a:xfrm>
           <a:prstGeom prst="rect">
@@ -8438,7 +7322,7 @@
         </p:nvSpPr>
         <p:spPr>
           <a:xfrm>
-            <a:off x="5076056" y="5445224"/>
+            <a:off x="5177718" y="5445224"/>
             <a:ext cx="72008" cy="72008"/>
           </a:xfrm>
           <a:prstGeom prst="rect">
@@ -8482,7 +7366,7 @@
         </p:nvSpPr>
         <p:spPr>
           <a:xfrm>
-            <a:off x="5724128" y="5445224"/>
+            <a:off x="5825790" y="5445224"/>
             <a:ext cx="72008" cy="72008"/>
           </a:xfrm>
           <a:prstGeom prst="rect">
@@ -8614,7 +7498,7 @@
         </p:nvSpPr>
         <p:spPr>
           <a:xfrm>
-            <a:off x="5652120" y="5445224"/>
+            <a:off x="5753782" y="5445224"/>
             <a:ext cx="72008" cy="72008"/>
           </a:xfrm>
           <a:prstGeom prst="rect">
@@ -9322,15 +8206,7 @@
                   <a:schemeClr val="bg1"/>
                 </a:solidFill>
               </a:rPr>
-              <a:t>N</a:t>
-            </a:r>
-            <a:r>
-              <a:rPr lang="en-US" altLang="ko-KR" sz="800" dirty="0" smtClean="0">
-                <a:solidFill>
-                  <a:schemeClr val="bg1"/>
-                </a:solidFill>
-              </a:rPr>
-              <a:t>ode</a:t>
+              <a:t>Node</a:t>
             </a:r>
             <a:endParaRPr lang="ko-KR" altLang="en-US" sz="800" dirty="0">
               <a:solidFill>
@@ -10434,23 +9310,7 @@
                   <a:schemeClr val="bg1"/>
                 </a:solidFill>
               </a:rPr>
-              <a:t>: JSON </a:t>
-            </a:r>
-            <a:r>
-              <a:rPr lang="en-US" altLang="ko-KR" sz="800" dirty="0" smtClean="0">
-                <a:solidFill>
-                  <a:schemeClr val="bg1"/>
-                </a:solidFill>
-              </a:rPr>
-              <a:t>event , </a:t>
-            </a:r>
-            <a:r>
-              <a:rPr lang="en-US" altLang="ko-KR" sz="800" dirty="0" smtClean="0">
-                <a:solidFill>
-                  <a:schemeClr val="bg1"/>
-                </a:solidFill>
-              </a:rPr>
-              <a:t>from A to B</a:t>
+              <a:t>: JSON event , from A to B</a:t>
             </a:r>
             <a:endParaRPr lang="ko-KR" altLang="en-US" sz="800" dirty="0">
               <a:solidFill>
@@ -11936,23 +10796,7 @@
                   <a:schemeClr val="bg1"/>
                 </a:solidFill>
               </a:rPr>
-              <a:t>rule </a:t>
-            </a:r>
-            <a:r>
-              <a:rPr lang="en-US" altLang="ko-KR" sz="800" dirty="0" smtClean="0">
-                <a:solidFill>
-                  <a:schemeClr val="bg1"/>
-                </a:solidFill>
-              </a:rPr>
-              <a:t>thread </a:t>
-            </a:r>
-            <a:r>
-              <a:rPr lang="en-US" altLang="ko-KR" sz="800" dirty="0" smtClean="0">
-                <a:solidFill>
-                  <a:schemeClr val="bg1"/>
-                </a:solidFill>
-              </a:rPr>
-              <a:t>object</a:t>
+              <a:t>rule thread object</a:t>
             </a:r>
             <a:endParaRPr lang="ko-KR" altLang="en-US" sz="800" dirty="0">
               <a:solidFill>
@@ -11992,11 +10836,6 @@
               </a:rPr>
               <a:t>Rule manager</a:t>
             </a:r>
-            <a:endParaRPr lang="en-US" altLang="ko-KR" sz="800" dirty="0" smtClean="0">
-              <a:solidFill>
-                <a:srgbClr val="FF0000"/>
-              </a:solidFill>
-            </a:endParaRPr>
           </a:p>
         </p:txBody>
       </p:sp>
@@ -12978,594 +11817,6 @@
       </p:cxnSp>
       <p:cxnSp>
         <p:nvCxnSpPr>
-          <p:cNvPr id="307" name="꺾인 연결선 425"/>
-          <p:cNvCxnSpPr>
-            <a:stCxn id="228" idx="2"/>
-            <a:endCxn id="227" idx="0"/>
-          </p:cNvCxnSpPr>
-          <p:nvPr/>
-        </p:nvCxnSpPr>
-        <p:spPr>
-          <a:xfrm rot="5400000">
-            <a:off x="3023828" y="4581128"/>
-            <a:ext cx="648072" cy="1080120"/>
-          </a:xfrm>
-          <a:prstGeom prst="bentConnector3">
-            <a:avLst>
-              <a:gd name="adj1" fmla="val 59006"/>
-            </a:avLst>
-          </a:prstGeom>
-          <a:ln>
-            <a:solidFill>
-              <a:srgbClr val="7030A0"/>
-            </a:solidFill>
-            <a:headEnd type="oval" w="sm" len="sm"/>
-            <a:tailEnd type="triangle" w="sm" len="sm"/>
-          </a:ln>
-        </p:spPr>
-        <p:style>
-          <a:lnRef idx="1">
-            <a:schemeClr val="accent1"/>
-          </a:lnRef>
-          <a:fillRef idx="0">
-            <a:schemeClr val="accent1"/>
-          </a:fillRef>
-          <a:effectRef idx="0">
-            <a:schemeClr val="accent1"/>
-          </a:effectRef>
-          <a:fontRef idx="minor">
-            <a:schemeClr val="tx1"/>
-          </a:fontRef>
-        </p:style>
-      </p:cxnSp>
-      <p:cxnSp>
-        <p:nvCxnSpPr>
-          <p:cNvPr id="310" name="꺾인 연결선 425"/>
-          <p:cNvCxnSpPr>
-            <a:stCxn id="240" idx="2"/>
-            <a:endCxn id="239" idx="0"/>
-          </p:cNvCxnSpPr>
-          <p:nvPr/>
-        </p:nvCxnSpPr>
-        <p:spPr>
-          <a:xfrm rot="5400000">
-            <a:off x="3455876" y="4797152"/>
-            <a:ext cx="648072" cy="648072"/>
-          </a:xfrm>
-          <a:prstGeom prst="bentConnector3">
-            <a:avLst>
-              <a:gd name="adj1" fmla="val 71014"/>
-            </a:avLst>
-          </a:prstGeom>
-          <a:ln>
-            <a:solidFill>
-              <a:srgbClr val="7030A0"/>
-            </a:solidFill>
-            <a:headEnd type="oval" w="sm" len="sm"/>
-            <a:tailEnd type="triangle" w="sm" len="sm"/>
-          </a:ln>
-        </p:spPr>
-        <p:style>
-          <a:lnRef idx="1">
-            <a:schemeClr val="accent1"/>
-          </a:lnRef>
-          <a:fillRef idx="0">
-            <a:schemeClr val="accent1"/>
-          </a:fillRef>
-          <a:effectRef idx="0">
-            <a:schemeClr val="accent1"/>
-          </a:effectRef>
-          <a:fontRef idx="minor">
-            <a:schemeClr val="tx1"/>
-          </a:fontRef>
-        </p:style>
-      </p:cxnSp>
-      <p:cxnSp>
-        <p:nvCxnSpPr>
-          <p:cNvPr id="311" name="꺾인 연결선 425"/>
-          <p:cNvCxnSpPr>
-            <a:stCxn id="248" idx="2"/>
-            <a:endCxn id="247" idx="0"/>
-          </p:cNvCxnSpPr>
-          <p:nvPr/>
-        </p:nvCxnSpPr>
-        <p:spPr>
-          <a:xfrm rot="5400000">
-            <a:off x="3887924" y="5013176"/>
-            <a:ext cx="648072" cy="216024"/>
-          </a:xfrm>
-          <a:prstGeom prst="bentConnector3">
-            <a:avLst>
-              <a:gd name="adj1" fmla="val 84524"/>
-            </a:avLst>
-          </a:prstGeom>
-          <a:ln>
-            <a:solidFill>
-              <a:srgbClr val="7030A0"/>
-            </a:solidFill>
-            <a:headEnd type="oval" w="sm" len="sm"/>
-            <a:tailEnd type="triangle" w="sm" len="sm"/>
-          </a:ln>
-        </p:spPr>
-        <p:style>
-          <a:lnRef idx="1">
-            <a:schemeClr val="accent1"/>
-          </a:lnRef>
-          <a:fillRef idx="0">
-            <a:schemeClr val="accent1"/>
-          </a:fillRef>
-          <a:effectRef idx="0">
-            <a:schemeClr val="accent1"/>
-          </a:effectRef>
-          <a:fontRef idx="minor">
-            <a:schemeClr val="tx1"/>
-          </a:fontRef>
-        </p:style>
-      </p:cxnSp>
-      <p:cxnSp>
-        <p:nvCxnSpPr>
-          <p:cNvPr id="312" name="꺾인 연결선 425"/>
-          <p:cNvCxnSpPr>
-            <a:stCxn id="256" idx="2"/>
-            <a:endCxn id="255" idx="0"/>
-          </p:cNvCxnSpPr>
-          <p:nvPr/>
-        </p:nvCxnSpPr>
-        <p:spPr>
-          <a:xfrm rot="16200000" flipH="1">
-            <a:off x="4247964" y="5085184"/>
-            <a:ext cx="648072" cy="72008"/>
-          </a:xfrm>
-          <a:prstGeom prst="bentConnector3">
-            <a:avLst>
-              <a:gd name="adj1" fmla="val 80020"/>
-            </a:avLst>
-          </a:prstGeom>
-          <a:ln>
-            <a:solidFill>
-              <a:srgbClr val="7030A0"/>
-            </a:solidFill>
-            <a:headEnd type="oval" w="sm" len="sm"/>
-            <a:tailEnd type="triangle" w="sm" len="sm"/>
-          </a:ln>
-        </p:spPr>
-        <p:style>
-          <a:lnRef idx="1">
-            <a:schemeClr val="accent1"/>
-          </a:lnRef>
-          <a:fillRef idx="0">
-            <a:schemeClr val="accent1"/>
-          </a:fillRef>
-          <a:effectRef idx="0">
-            <a:schemeClr val="accent1"/>
-          </a:effectRef>
-          <a:fontRef idx="minor">
-            <a:schemeClr val="tx1"/>
-          </a:fontRef>
-        </p:style>
-      </p:cxnSp>
-      <p:cxnSp>
-        <p:nvCxnSpPr>
-          <p:cNvPr id="314" name="꺾인 연결선 425"/>
-          <p:cNvCxnSpPr>
-            <a:stCxn id="267" idx="2"/>
-            <a:endCxn id="266" idx="0"/>
-          </p:cNvCxnSpPr>
-          <p:nvPr/>
-        </p:nvCxnSpPr>
-        <p:spPr>
-          <a:xfrm rot="16200000" flipH="1">
-            <a:off x="4644008" y="4905164"/>
-            <a:ext cx="648072" cy="432048"/>
-          </a:xfrm>
-          <a:prstGeom prst="bentConnector3">
-            <a:avLst>
-              <a:gd name="adj1" fmla="val 74016"/>
-            </a:avLst>
-          </a:prstGeom>
-          <a:ln>
-            <a:solidFill>
-              <a:srgbClr val="7030A0"/>
-            </a:solidFill>
-            <a:headEnd type="oval" w="sm" len="sm"/>
-            <a:tailEnd type="triangle" w="sm" len="sm"/>
-          </a:ln>
-        </p:spPr>
-        <p:style>
-          <a:lnRef idx="1">
-            <a:schemeClr val="accent1"/>
-          </a:lnRef>
-          <a:fillRef idx="0">
-            <a:schemeClr val="accent1"/>
-          </a:fillRef>
-          <a:effectRef idx="0">
-            <a:schemeClr val="accent1"/>
-          </a:effectRef>
-          <a:fontRef idx="minor">
-            <a:schemeClr val="tx1"/>
-          </a:fontRef>
-        </p:style>
-      </p:cxnSp>
-      <p:cxnSp>
-        <p:nvCxnSpPr>
-          <p:cNvPr id="324" name="꺾인 연결선 425"/>
-          <p:cNvCxnSpPr>
-            <a:stCxn id="273" idx="2"/>
-            <a:endCxn id="272" idx="0"/>
-          </p:cNvCxnSpPr>
-          <p:nvPr/>
-        </p:nvCxnSpPr>
-        <p:spPr>
-          <a:xfrm rot="16200000" flipH="1">
-            <a:off x="5040052" y="4725144"/>
-            <a:ext cx="648072" cy="792088"/>
-          </a:xfrm>
-          <a:prstGeom prst="bentConnector3">
-            <a:avLst>
-              <a:gd name="adj1" fmla="val 59006"/>
-            </a:avLst>
-          </a:prstGeom>
-          <a:ln>
-            <a:solidFill>
-              <a:srgbClr val="7030A0"/>
-            </a:solidFill>
-            <a:headEnd type="oval" w="sm" len="sm"/>
-            <a:tailEnd type="triangle" w="sm" len="sm"/>
-          </a:ln>
-        </p:spPr>
-        <p:style>
-          <a:lnRef idx="1">
-            <a:schemeClr val="accent1"/>
-          </a:lnRef>
-          <a:fillRef idx="0">
-            <a:schemeClr val="accent1"/>
-          </a:fillRef>
-          <a:effectRef idx="0">
-            <a:schemeClr val="accent1"/>
-          </a:effectRef>
-          <a:fontRef idx="minor">
-            <a:schemeClr val="tx1"/>
-          </a:fontRef>
-        </p:style>
-      </p:cxnSp>
-      <p:cxnSp>
-        <p:nvCxnSpPr>
-          <p:cNvPr id="325" name="꺾인 연결선 425"/>
-          <p:cNvCxnSpPr>
-            <a:stCxn id="279" idx="2"/>
-            <a:endCxn id="278" idx="0"/>
-          </p:cNvCxnSpPr>
-          <p:nvPr/>
-        </p:nvCxnSpPr>
-        <p:spPr>
-          <a:xfrm rot="16200000" flipH="1">
-            <a:off x="5436096" y="4545124"/>
-            <a:ext cx="648072" cy="1152128"/>
-          </a:xfrm>
-          <a:prstGeom prst="bentConnector3">
-            <a:avLst>
-              <a:gd name="adj1" fmla="val 38742"/>
-            </a:avLst>
-          </a:prstGeom>
-          <a:ln>
-            <a:solidFill>
-              <a:srgbClr val="7030A0"/>
-            </a:solidFill>
-            <a:headEnd type="oval" w="sm" len="sm"/>
-            <a:tailEnd type="triangle" w="sm" len="sm"/>
-          </a:ln>
-        </p:spPr>
-        <p:style>
-          <a:lnRef idx="1">
-            <a:schemeClr val="accent1"/>
-          </a:lnRef>
-          <a:fillRef idx="0">
-            <a:schemeClr val="accent1"/>
-          </a:fillRef>
-          <a:effectRef idx="0">
-            <a:schemeClr val="accent1"/>
-          </a:effectRef>
-          <a:fontRef idx="minor">
-            <a:schemeClr val="tx1"/>
-          </a:fontRef>
-        </p:style>
-      </p:cxnSp>
-      <p:cxnSp>
-        <p:nvCxnSpPr>
-          <p:cNvPr id="330" name="꺾인 연결선 425"/>
-          <p:cNvCxnSpPr>
-            <a:stCxn id="231" idx="0"/>
-            <a:endCxn id="230" idx="2"/>
-          </p:cNvCxnSpPr>
-          <p:nvPr/>
-        </p:nvCxnSpPr>
-        <p:spPr>
-          <a:xfrm rot="5400000" flipH="1" flipV="1">
-            <a:off x="2951820" y="4581128"/>
-            <a:ext cx="648072" cy="1080120"/>
-          </a:xfrm>
-          <a:prstGeom prst="bentConnector3">
-            <a:avLst>
-              <a:gd name="adj1" fmla="val 50000"/>
-            </a:avLst>
-          </a:prstGeom>
-          <a:ln>
-            <a:solidFill>
-              <a:srgbClr val="7030A0"/>
-            </a:solidFill>
-            <a:headEnd type="oval" w="sm" len="sm"/>
-            <a:tailEnd type="triangle" w="sm" len="sm"/>
-          </a:ln>
-        </p:spPr>
-        <p:style>
-          <a:lnRef idx="1">
-            <a:schemeClr val="accent1"/>
-          </a:lnRef>
-          <a:fillRef idx="0">
-            <a:schemeClr val="accent1"/>
-          </a:fillRef>
-          <a:effectRef idx="0">
-            <a:schemeClr val="accent1"/>
-          </a:effectRef>
-          <a:fontRef idx="minor">
-            <a:schemeClr val="tx1"/>
-          </a:fontRef>
-        </p:style>
-      </p:cxnSp>
-      <p:cxnSp>
-        <p:nvCxnSpPr>
-          <p:cNvPr id="333" name="꺾인 연결선 425"/>
-          <p:cNvCxnSpPr>
-            <a:stCxn id="243" idx="0"/>
-            <a:endCxn id="242" idx="2"/>
-          </p:cNvCxnSpPr>
-          <p:nvPr/>
-        </p:nvCxnSpPr>
-        <p:spPr>
-          <a:xfrm rot="5400000" flipH="1" flipV="1">
-            <a:off x="3383868" y="4797152"/>
-            <a:ext cx="648072" cy="648072"/>
-          </a:xfrm>
-          <a:prstGeom prst="bentConnector3">
-            <a:avLst>
-              <a:gd name="adj1" fmla="val 34239"/>
-            </a:avLst>
-          </a:prstGeom>
-          <a:ln>
-            <a:solidFill>
-              <a:srgbClr val="7030A0"/>
-            </a:solidFill>
-            <a:headEnd type="oval" w="sm" len="sm"/>
-            <a:tailEnd type="triangle" w="sm" len="sm"/>
-          </a:ln>
-        </p:spPr>
-        <p:style>
-          <a:lnRef idx="1">
-            <a:schemeClr val="accent1"/>
-          </a:lnRef>
-          <a:fillRef idx="0">
-            <a:schemeClr val="accent1"/>
-          </a:fillRef>
-          <a:effectRef idx="0">
-            <a:schemeClr val="accent1"/>
-          </a:effectRef>
-          <a:fontRef idx="minor">
-            <a:schemeClr val="tx1"/>
-          </a:fontRef>
-        </p:style>
-      </p:cxnSp>
-      <p:cxnSp>
-        <p:nvCxnSpPr>
-          <p:cNvPr id="336" name="꺾인 연결선 425"/>
-          <p:cNvCxnSpPr>
-            <a:stCxn id="251" idx="0"/>
-            <a:endCxn id="250" idx="2"/>
-          </p:cNvCxnSpPr>
-          <p:nvPr/>
-        </p:nvCxnSpPr>
-        <p:spPr>
-          <a:xfrm rot="5400000" flipH="1" flipV="1">
-            <a:off x="3815916" y="5013176"/>
-            <a:ext cx="648072" cy="216024"/>
-          </a:xfrm>
-          <a:prstGeom prst="bentConnector3">
-            <a:avLst>
-              <a:gd name="adj1" fmla="val 22231"/>
-            </a:avLst>
-          </a:prstGeom>
-          <a:ln>
-            <a:solidFill>
-              <a:srgbClr val="7030A0"/>
-            </a:solidFill>
-            <a:headEnd type="oval" w="sm" len="sm"/>
-            <a:tailEnd type="triangle" w="sm" len="sm"/>
-          </a:ln>
-        </p:spPr>
-        <p:style>
-          <a:lnRef idx="1">
-            <a:schemeClr val="accent1"/>
-          </a:lnRef>
-          <a:fillRef idx="0">
-            <a:schemeClr val="accent1"/>
-          </a:fillRef>
-          <a:effectRef idx="0">
-            <a:schemeClr val="accent1"/>
-          </a:effectRef>
-          <a:fontRef idx="minor">
-            <a:schemeClr val="tx1"/>
-          </a:fontRef>
-        </p:style>
-      </p:cxnSp>
-      <p:cxnSp>
-        <p:nvCxnSpPr>
-          <p:cNvPr id="349" name="꺾인 연결선 425"/>
-          <p:cNvCxnSpPr>
-            <a:stCxn id="259" idx="0"/>
-            <a:endCxn id="258" idx="2"/>
-          </p:cNvCxnSpPr>
-          <p:nvPr/>
-        </p:nvCxnSpPr>
-        <p:spPr>
-          <a:xfrm rot="16200000" flipV="1">
-            <a:off x="4175956" y="5085184"/>
-            <a:ext cx="648072" cy="72008"/>
-          </a:xfrm>
-          <a:prstGeom prst="bentConnector3">
-            <a:avLst>
-              <a:gd name="adj1" fmla="val 12475"/>
-            </a:avLst>
-          </a:prstGeom>
-          <a:ln>
-            <a:solidFill>
-              <a:srgbClr val="7030A0"/>
-            </a:solidFill>
-            <a:headEnd type="oval" w="sm" len="sm"/>
-            <a:tailEnd type="triangle" w="sm" len="sm"/>
-          </a:ln>
-        </p:spPr>
-        <p:style>
-          <a:lnRef idx="1">
-            <a:schemeClr val="accent1"/>
-          </a:lnRef>
-          <a:fillRef idx="0">
-            <a:schemeClr val="accent1"/>
-          </a:fillRef>
-          <a:effectRef idx="0">
-            <a:schemeClr val="accent1"/>
-          </a:effectRef>
-          <a:fontRef idx="minor">
-            <a:schemeClr val="tx1"/>
-          </a:fontRef>
-        </p:style>
-      </p:cxnSp>
-      <p:cxnSp>
-        <p:nvCxnSpPr>
-          <p:cNvPr id="352" name="꺾인 연결선 425"/>
-          <p:cNvCxnSpPr>
-            <a:stCxn id="270" idx="0"/>
-            <a:endCxn id="269" idx="2"/>
-          </p:cNvCxnSpPr>
-          <p:nvPr/>
-        </p:nvCxnSpPr>
-        <p:spPr>
-          <a:xfrm rot="16200000" flipV="1">
-            <a:off x="4572000" y="4905164"/>
-            <a:ext cx="648072" cy="432048"/>
-          </a:xfrm>
-          <a:prstGeom prst="bentConnector3">
-            <a:avLst>
-              <a:gd name="adj1" fmla="val 16228"/>
-            </a:avLst>
-          </a:prstGeom>
-          <a:ln>
-            <a:solidFill>
-              <a:srgbClr val="7030A0"/>
-            </a:solidFill>
-            <a:headEnd type="oval" w="sm" len="sm"/>
-            <a:tailEnd type="triangle" w="sm" len="sm"/>
-          </a:ln>
-        </p:spPr>
-        <p:style>
-          <a:lnRef idx="1">
-            <a:schemeClr val="accent1"/>
-          </a:lnRef>
-          <a:fillRef idx="0">
-            <a:schemeClr val="accent1"/>
-          </a:fillRef>
-          <a:effectRef idx="0">
-            <a:schemeClr val="accent1"/>
-          </a:effectRef>
-          <a:fontRef idx="minor">
-            <a:schemeClr val="tx1"/>
-          </a:fontRef>
-        </p:style>
-      </p:cxnSp>
-      <p:cxnSp>
-        <p:nvCxnSpPr>
-          <p:cNvPr id="355" name="꺾인 연결선 425"/>
-          <p:cNvCxnSpPr>
-            <a:stCxn id="276" idx="0"/>
-            <a:endCxn id="275" idx="2"/>
-          </p:cNvCxnSpPr>
-          <p:nvPr/>
-        </p:nvCxnSpPr>
-        <p:spPr>
-          <a:xfrm rot="16200000" flipV="1">
-            <a:off x="4968044" y="4725144"/>
-            <a:ext cx="648072" cy="792088"/>
-          </a:xfrm>
-          <a:prstGeom prst="bentConnector3">
-            <a:avLst>
-              <a:gd name="adj1" fmla="val 31988"/>
-            </a:avLst>
-          </a:prstGeom>
-          <a:ln>
-            <a:solidFill>
-              <a:srgbClr val="7030A0"/>
-            </a:solidFill>
-            <a:headEnd type="oval" w="sm" len="sm"/>
-            <a:tailEnd type="triangle" w="sm" len="sm"/>
-          </a:ln>
-        </p:spPr>
-        <p:style>
-          <a:lnRef idx="1">
-            <a:schemeClr val="accent1"/>
-          </a:lnRef>
-          <a:fillRef idx="0">
-            <a:schemeClr val="accent1"/>
-          </a:fillRef>
-          <a:effectRef idx="0">
-            <a:schemeClr val="accent1"/>
-          </a:effectRef>
-          <a:fontRef idx="minor">
-            <a:schemeClr val="tx1"/>
-          </a:fontRef>
-        </p:style>
-      </p:cxnSp>
-      <p:cxnSp>
-        <p:nvCxnSpPr>
-          <p:cNvPr id="359" name="꺾인 연결선 425"/>
-          <p:cNvCxnSpPr>
-            <a:stCxn id="282" idx="0"/>
-            <a:endCxn id="281" idx="2"/>
-          </p:cNvCxnSpPr>
-          <p:nvPr/>
-        </p:nvCxnSpPr>
-        <p:spPr>
-          <a:xfrm rot="16200000" flipV="1">
-            <a:off x="5364088" y="4545124"/>
-            <a:ext cx="648072" cy="1152128"/>
-          </a:xfrm>
-          <a:prstGeom prst="bentConnector3">
-            <a:avLst>
-              <a:gd name="adj1" fmla="val 50000"/>
-            </a:avLst>
-          </a:prstGeom>
-          <a:ln>
-            <a:solidFill>
-              <a:srgbClr val="7030A0"/>
-            </a:solidFill>
-            <a:headEnd type="oval" w="sm" len="sm"/>
-            <a:tailEnd type="triangle" w="sm" len="sm"/>
-          </a:ln>
-        </p:spPr>
-        <p:style>
-          <a:lnRef idx="1">
-            <a:schemeClr val="accent1"/>
-          </a:lnRef>
-          <a:fillRef idx="0">
-            <a:schemeClr val="accent1"/>
-          </a:fillRef>
-          <a:effectRef idx="0">
-            <a:schemeClr val="accent1"/>
-          </a:effectRef>
-          <a:fontRef idx="minor">
-            <a:schemeClr val="tx1"/>
-          </a:fontRef>
-        </p:style>
-      </p:cxnSp>
-      <p:cxnSp>
-        <p:nvCxnSpPr>
           <p:cNvPr id="379" name="꺾인 연결선 425"/>
           <p:cNvCxnSpPr>
             <a:stCxn id="208" idx="2"/>
@@ -14035,10 +12286,662 @@
           </a:fontRef>
         </p:style>
       </p:cxnSp>
+      <p:sp>
+        <p:nvSpPr>
+          <p:cNvPr id="215" name="직사각형 214"/>
+          <p:cNvSpPr/>
+          <p:nvPr/>
+        </p:nvSpPr>
+        <p:spPr>
+          <a:xfrm>
+            <a:off x="3746035" y="4320053"/>
+            <a:ext cx="1728192" cy="432048"/>
+          </a:xfrm>
+          <a:prstGeom prst="rect">
+            <a:avLst/>
+          </a:prstGeom>
+          <a:solidFill>
+            <a:srgbClr val="92D050"/>
+          </a:solidFill>
+          <a:ln w="6350">
+            <a:solidFill>
+              <a:schemeClr val="bg1"/>
+            </a:solidFill>
+          </a:ln>
+        </p:spPr>
+        <p:style>
+          <a:lnRef idx="2">
+            <a:schemeClr val="accent1">
+              <a:shade val="50000"/>
+            </a:schemeClr>
+          </a:lnRef>
+          <a:fillRef idx="1">
+            <a:schemeClr val="accent1"/>
+          </a:fillRef>
+          <a:effectRef idx="0">
+            <a:schemeClr val="accent1"/>
+          </a:effectRef>
+          <a:fontRef idx="minor">
+            <a:schemeClr val="lt1"/>
+          </a:fontRef>
+        </p:style>
+        <p:txBody>
+          <a:bodyPr rtlCol="0" anchor="ctr"/>
+          <a:lstStyle/>
+          <a:p>
+            <a:pPr algn="ctr"/>
+            <a:r>
+              <a:rPr lang="en-US" altLang="ko-KR" sz="1000" dirty="0" smtClean="0">
+                <a:solidFill>
+                  <a:schemeClr val="bg1"/>
+                </a:solidFill>
+              </a:rPr>
+              <a:t>Node</a:t>
+            </a:r>
+          </a:p>
+        </p:txBody>
+      </p:sp>
+      <p:sp>
+        <p:nvSpPr>
+          <p:cNvPr id="27" name="직사각형 26"/>
+          <p:cNvSpPr/>
+          <p:nvPr/>
+        </p:nvSpPr>
+        <p:spPr>
+          <a:xfrm>
+            <a:off x="3707904" y="4365104"/>
+            <a:ext cx="1728192" cy="432048"/>
+          </a:xfrm>
+          <a:prstGeom prst="rect">
+            <a:avLst/>
+          </a:prstGeom>
+          <a:solidFill>
+            <a:srgbClr val="92D050"/>
+          </a:solidFill>
+          <a:ln w="6350">
+            <a:solidFill>
+              <a:schemeClr val="bg1"/>
+            </a:solidFill>
+          </a:ln>
+        </p:spPr>
+        <p:style>
+          <a:lnRef idx="2">
+            <a:schemeClr val="accent1">
+              <a:shade val="50000"/>
+            </a:schemeClr>
+          </a:lnRef>
+          <a:fillRef idx="1">
+            <a:schemeClr val="accent1"/>
+          </a:fillRef>
+          <a:effectRef idx="0">
+            <a:schemeClr val="accent1"/>
+          </a:effectRef>
+          <a:fontRef idx="minor">
+            <a:schemeClr val="lt1"/>
+          </a:fontRef>
+        </p:style>
+        <p:txBody>
+          <a:bodyPr rtlCol="0" anchor="ctr"/>
+          <a:lstStyle/>
+          <a:p>
+            <a:pPr algn="ctr"/>
+            <a:r>
+              <a:rPr lang="en-US" altLang="ko-KR" sz="1000" dirty="0" smtClean="0">
+                <a:solidFill>
+                  <a:schemeClr val="bg1"/>
+                </a:solidFill>
+              </a:rPr>
+              <a:t>Node</a:t>
+            </a:r>
+          </a:p>
+        </p:txBody>
+      </p:sp>
+      <p:sp>
+        <p:nvSpPr>
+          <p:cNvPr id="216" name="직사각형 215"/>
+          <p:cNvSpPr/>
+          <p:nvPr/>
+        </p:nvSpPr>
+        <p:spPr>
+          <a:xfrm>
+            <a:off x="3598378" y="5418751"/>
+            <a:ext cx="648000" cy="360040"/>
+          </a:xfrm>
+          <a:prstGeom prst="rect">
+            <a:avLst/>
+          </a:prstGeom>
+          <a:solidFill>
+            <a:srgbClr val="FFC000"/>
+          </a:solidFill>
+          <a:ln w="6350">
+            <a:solidFill>
+              <a:schemeClr val="bg1"/>
+            </a:solidFill>
+          </a:ln>
+        </p:spPr>
+        <p:style>
+          <a:lnRef idx="2">
+            <a:schemeClr val="accent1">
+              <a:shade val="50000"/>
+            </a:schemeClr>
+          </a:lnRef>
+          <a:fillRef idx="1">
+            <a:schemeClr val="accent1"/>
+          </a:fillRef>
+          <a:effectRef idx="0">
+            <a:schemeClr val="accent1"/>
+          </a:effectRef>
+          <a:fontRef idx="minor">
+            <a:schemeClr val="lt1"/>
+          </a:fontRef>
+        </p:style>
+        <p:txBody>
+          <a:bodyPr rtlCol="0" anchor="ctr"/>
+          <a:lstStyle/>
+          <a:p>
+            <a:pPr algn="ctr"/>
+            <a:r>
+              <a:rPr lang="en-US" altLang="ko-KR" sz="800" dirty="0" smtClean="0">
+                <a:solidFill>
+                  <a:schemeClr val="bg1"/>
+                </a:solidFill>
+              </a:rPr>
+              <a:t>actuators</a:t>
+            </a:r>
+            <a:endParaRPr lang="ko-KR" altLang="en-US" sz="800" dirty="0">
+              <a:solidFill>
+                <a:schemeClr val="bg1"/>
+              </a:solidFill>
+            </a:endParaRPr>
+          </a:p>
+        </p:txBody>
+      </p:sp>
+      <p:sp>
+        <p:nvSpPr>
+          <p:cNvPr id="98" name="직사각형 97"/>
+          <p:cNvSpPr/>
+          <p:nvPr/>
+        </p:nvSpPr>
+        <p:spPr>
+          <a:xfrm>
+            <a:off x="3569764" y="5445224"/>
+            <a:ext cx="648000" cy="360040"/>
+          </a:xfrm>
+          <a:prstGeom prst="rect">
+            <a:avLst/>
+          </a:prstGeom>
+          <a:solidFill>
+            <a:srgbClr val="FFC000"/>
+          </a:solidFill>
+          <a:ln w="6350">
+            <a:solidFill>
+              <a:schemeClr val="bg1"/>
+            </a:solidFill>
+          </a:ln>
+        </p:spPr>
+        <p:style>
+          <a:lnRef idx="2">
+            <a:schemeClr val="accent1">
+              <a:shade val="50000"/>
+            </a:schemeClr>
+          </a:lnRef>
+          <a:fillRef idx="1">
+            <a:schemeClr val="accent1"/>
+          </a:fillRef>
+          <a:effectRef idx="0">
+            <a:schemeClr val="accent1"/>
+          </a:effectRef>
+          <a:fontRef idx="minor">
+            <a:schemeClr val="lt1"/>
+          </a:fontRef>
+        </p:style>
+        <p:txBody>
+          <a:bodyPr rtlCol="0" anchor="ctr"/>
+          <a:lstStyle/>
+          <a:p>
+            <a:pPr algn="ctr"/>
+            <a:r>
+              <a:rPr lang="en-US" altLang="ko-KR" sz="800" dirty="0" smtClean="0">
+                <a:solidFill>
+                  <a:schemeClr val="bg1"/>
+                </a:solidFill>
+              </a:rPr>
+              <a:t>actuators</a:t>
+            </a:r>
+            <a:endParaRPr lang="ko-KR" altLang="en-US" sz="800" dirty="0">
+              <a:solidFill>
+                <a:schemeClr val="bg1"/>
+              </a:solidFill>
+            </a:endParaRPr>
+          </a:p>
+        </p:txBody>
+      </p:sp>
+      <p:cxnSp>
+        <p:nvCxnSpPr>
+          <p:cNvPr id="311" name="꺾인 연결선 425"/>
+          <p:cNvCxnSpPr>
+            <a:endCxn id="98" idx="0"/>
+          </p:cNvCxnSpPr>
+          <p:nvPr/>
+        </p:nvCxnSpPr>
+        <p:spPr>
+          <a:xfrm rot="5400000">
+            <a:off x="3819631" y="4871286"/>
+            <a:ext cx="648071" cy="499804"/>
+          </a:xfrm>
+          <a:prstGeom prst="bentConnector3">
+            <a:avLst>
+              <a:gd name="adj1" fmla="val 50000"/>
+            </a:avLst>
+          </a:prstGeom>
+          <a:ln>
+            <a:solidFill>
+              <a:srgbClr val="7030A0"/>
+            </a:solidFill>
+            <a:headEnd type="oval" w="sm" len="sm"/>
+            <a:tailEnd type="triangle" w="sm" len="sm"/>
+          </a:ln>
+        </p:spPr>
+        <p:style>
+          <a:lnRef idx="1">
+            <a:schemeClr val="accent1"/>
+          </a:lnRef>
+          <a:fillRef idx="0">
+            <a:schemeClr val="accent1"/>
+          </a:fillRef>
+          <a:effectRef idx="0">
+            <a:schemeClr val="accent1"/>
+          </a:effectRef>
+          <a:fontRef idx="minor">
+            <a:schemeClr val="tx1"/>
+          </a:fontRef>
+        </p:style>
+      </p:cxnSp>
+      <p:sp>
+        <p:nvSpPr>
+          <p:cNvPr id="218" name="직사각형 217"/>
+          <p:cNvSpPr/>
+          <p:nvPr/>
+        </p:nvSpPr>
+        <p:spPr>
+          <a:xfrm>
+            <a:off x="4346451" y="5420841"/>
+            <a:ext cx="648000" cy="360040"/>
+          </a:xfrm>
+          <a:prstGeom prst="rect">
+            <a:avLst/>
+          </a:prstGeom>
+          <a:solidFill>
+            <a:srgbClr val="FFC000"/>
+          </a:solidFill>
+          <a:ln w="6350">
+            <a:solidFill>
+              <a:schemeClr val="bg1"/>
+            </a:solidFill>
+          </a:ln>
+        </p:spPr>
+        <p:style>
+          <a:lnRef idx="2">
+            <a:schemeClr val="accent1">
+              <a:shade val="50000"/>
+            </a:schemeClr>
+          </a:lnRef>
+          <a:fillRef idx="1">
+            <a:schemeClr val="accent1"/>
+          </a:fillRef>
+          <a:effectRef idx="0">
+            <a:schemeClr val="accent1"/>
+          </a:effectRef>
+          <a:fontRef idx="minor">
+            <a:schemeClr val="lt1"/>
+          </a:fontRef>
+        </p:style>
+        <p:txBody>
+          <a:bodyPr rtlCol="0" anchor="ctr"/>
+          <a:lstStyle/>
+          <a:p>
+            <a:pPr algn="ctr"/>
+            <a:r>
+              <a:rPr lang="en-US" altLang="ko-KR" sz="800" dirty="0" smtClean="0">
+                <a:solidFill>
+                  <a:schemeClr val="bg1"/>
+                </a:solidFill>
+              </a:rPr>
+              <a:t>sensors</a:t>
+            </a:r>
+            <a:endParaRPr lang="ko-KR" altLang="en-US" sz="800" dirty="0">
+              <a:solidFill>
+                <a:schemeClr val="bg1"/>
+              </a:solidFill>
+            </a:endParaRPr>
+          </a:p>
+        </p:txBody>
+      </p:sp>
+      <p:sp>
+        <p:nvSpPr>
+          <p:cNvPr id="99" name="직사각형 98"/>
+          <p:cNvSpPr/>
+          <p:nvPr/>
+        </p:nvSpPr>
+        <p:spPr>
+          <a:xfrm>
+            <a:off x="4313622" y="5445224"/>
+            <a:ext cx="648000" cy="360040"/>
+          </a:xfrm>
+          <a:prstGeom prst="rect">
+            <a:avLst/>
+          </a:prstGeom>
+          <a:solidFill>
+            <a:srgbClr val="FFC000"/>
+          </a:solidFill>
+          <a:ln w="6350">
+            <a:solidFill>
+              <a:schemeClr val="bg1"/>
+            </a:solidFill>
+          </a:ln>
+        </p:spPr>
+        <p:style>
+          <a:lnRef idx="2">
+            <a:schemeClr val="accent1">
+              <a:shade val="50000"/>
+            </a:schemeClr>
+          </a:lnRef>
+          <a:fillRef idx="1">
+            <a:schemeClr val="accent1"/>
+          </a:fillRef>
+          <a:effectRef idx="0">
+            <a:schemeClr val="accent1"/>
+          </a:effectRef>
+          <a:fontRef idx="minor">
+            <a:schemeClr val="lt1"/>
+          </a:fontRef>
+        </p:style>
+        <p:txBody>
+          <a:bodyPr rtlCol="0" anchor="ctr"/>
+          <a:lstStyle/>
+          <a:p>
+            <a:pPr algn="ctr"/>
+            <a:r>
+              <a:rPr lang="en-US" altLang="ko-KR" sz="800" dirty="0" smtClean="0">
+                <a:solidFill>
+                  <a:schemeClr val="bg1"/>
+                </a:solidFill>
+              </a:rPr>
+              <a:t>sensors</a:t>
+            </a:r>
+            <a:endParaRPr lang="ko-KR" altLang="en-US" sz="800" dirty="0">
+              <a:solidFill>
+                <a:schemeClr val="bg1"/>
+              </a:solidFill>
+            </a:endParaRPr>
+          </a:p>
+        </p:txBody>
+      </p:sp>
+      <p:cxnSp>
+        <p:nvCxnSpPr>
+          <p:cNvPr id="349" name="꺾인 연결선 425"/>
+          <p:cNvCxnSpPr>
+            <a:stCxn id="99" idx="0"/>
+          </p:cNvCxnSpPr>
+          <p:nvPr/>
+        </p:nvCxnSpPr>
+        <p:spPr>
+          <a:xfrm rot="16200000" flipV="1">
+            <a:off x="4288888" y="5096490"/>
+            <a:ext cx="649291" cy="48178"/>
+          </a:xfrm>
+          <a:prstGeom prst="bentConnector3">
+            <a:avLst>
+              <a:gd name="adj1" fmla="val 50000"/>
+            </a:avLst>
+          </a:prstGeom>
+          <a:ln>
+            <a:solidFill>
+              <a:srgbClr val="7030A0"/>
+            </a:solidFill>
+            <a:headEnd type="oval" w="sm" len="sm"/>
+            <a:tailEnd type="triangle" w="sm" len="sm"/>
+          </a:ln>
+        </p:spPr>
+        <p:style>
+          <a:lnRef idx="1">
+            <a:schemeClr val="accent1"/>
+          </a:lnRef>
+          <a:fillRef idx="0">
+            <a:schemeClr val="accent1"/>
+          </a:fillRef>
+          <a:effectRef idx="0">
+            <a:schemeClr val="accent1"/>
+          </a:effectRef>
+          <a:fontRef idx="minor">
+            <a:schemeClr val="tx1"/>
+          </a:fontRef>
+        </p:style>
+      </p:cxnSp>
+      <p:sp>
+        <p:nvSpPr>
+          <p:cNvPr id="219" name="직사각형 218"/>
+          <p:cNvSpPr/>
+          <p:nvPr/>
+        </p:nvSpPr>
+        <p:spPr>
+          <a:xfrm>
+            <a:off x="5062277" y="5420841"/>
+            <a:ext cx="648000" cy="360040"/>
+          </a:xfrm>
+          <a:prstGeom prst="rect">
+            <a:avLst/>
+          </a:prstGeom>
+          <a:solidFill>
+            <a:srgbClr val="FFC000"/>
+          </a:solidFill>
+          <a:ln w="6350">
+            <a:solidFill>
+              <a:schemeClr val="bg1"/>
+            </a:solidFill>
+          </a:ln>
+        </p:spPr>
+        <p:style>
+          <a:lnRef idx="2">
+            <a:schemeClr val="accent1">
+              <a:shade val="50000"/>
+            </a:schemeClr>
+          </a:lnRef>
+          <a:fillRef idx="1">
+            <a:schemeClr val="accent1"/>
+          </a:fillRef>
+          <a:effectRef idx="0">
+            <a:schemeClr val="accent1"/>
+          </a:effectRef>
+          <a:fontRef idx="minor">
+            <a:schemeClr val="lt1"/>
+          </a:fontRef>
+        </p:style>
+        <p:txBody>
+          <a:bodyPr rtlCol="0" anchor="ctr"/>
+          <a:lstStyle/>
+          <a:p>
+            <a:pPr algn="ctr"/>
+            <a:r>
+              <a:rPr lang="en-US" altLang="ko-KR" sz="800" dirty="0" smtClean="0">
+                <a:solidFill>
+                  <a:schemeClr val="bg1"/>
+                </a:solidFill>
+              </a:rPr>
+              <a:t>Default</a:t>
+            </a:r>
+          </a:p>
+          <a:p>
+            <a:pPr algn="ctr"/>
+            <a:r>
+              <a:rPr lang="en-US" altLang="ko-KR" sz="800" dirty="0" smtClean="0">
+                <a:solidFill>
+                  <a:schemeClr val="bg1"/>
+                </a:solidFill>
+              </a:rPr>
+              <a:t>sensors</a:t>
+            </a:r>
+            <a:endParaRPr lang="ko-KR" altLang="en-US" sz="800" dirty="0">
+              <a:solidFill>
+                <a:schemeClr val="bg1"/>
+              </a:solidFill>
+            </a:endParaRPr>
+          </a:p>
+        </p:txBody>
+      </p:sp>
+      <p:sp>
+        <p:nvSpPr>
+          <p:cNvPr id="100" name="직사각형 99"/>
+          <p:cNvSpPr/>
+          <p:nvPr/>
+        </p:nvSpPr>
+        <p:spPr>
+          <a:xfrm>
+            <a:off x="5033702" y="5446303"/>
+            <a:ext cx="648000" cy="360040"/>
+          </a:xfrm>
+          <a:prstGeom prst="rect">
+            <a:avLst/>
+          </a:prstGeom>
+          <a:solidFill>
+            <a:srgbClr val="FFC000"/>
+          </a:solidFill>
+          <a:ln w="6350">
+            <a:solidFill>
+              <a:schemeClr val="bg1"/>
+            </a:solidFill>
+          </a:ln>
+        </p:spPr>
+        <p:style>
+          <a:lnRef idx="2">
+            <a:schemeClr val="accent1">
+              <a:shade val="50000"/>
+            </a:schemeClr>
+          </a:lnRef>
+          <a:fillRef idx="1">
+            <a:schemeClr val="accent1"/>
+          </a:fillRef>
+          <a:effectRef idx="0">
+            <a:schemeClr val="accent1"/>
+          </a:effectRef>
+          <a:fontRef idx="minor">
+            <a:schemeClr val="lt1"/>
+          </a:fontRef>
+        </p:style>
+        <p:txBody>
+          <a:bodyPr rtlCol="0" anchor="ctr"/>
+          <a:lstStyle/>
+          <a:p>
+            <a:pPr algn="ctr"/>
+            <a:r>
+              <a:rPr lang="en-US" altLang="ko-KR" sz="800" dirty="0" smtClean="0">
+                <a:solidFill>
+                  <a:schemeClr val="bg1"/>
+                </a:solidFill>
+              </a:rPr>
+              <a:t>Default</a:t>
+            </a:r>
+          </a:p>
+          <a:p>
+            <a:pPr algn="ctr"/>
+            <a:r>
+              <a:rPr lang="en-US" altLang="ko-KR" sz="800" dirty="0" smtClean="0">
+                <a:solidFill>
+                  <a:schemeClr val="bg1"/>
+                </a:solidFill>
+              </a:rPr>
+              <a:t>sensors</a:t>
+            </a:r>
+            <a:endParaRPr lang="ko-KR" altLang="en-US" sz="800" dirty="0">
+              <a:solidFill>
+                <a:schemeClr val="bg1"/>
+              </a:solidFill>
+            </a:endParaRPr>
+          </a:p>
+        </p:txBody>
+      </p:sp>
+      <p:cxnSp>
+        <p:nvCxnSpPr>
+          <p:cNvPr id="352" name="꺾인 연결선 425"/>
+          <p:cNvCxnSpPr/>
+          <p:nvPr/>
+        </p:nvCxnSpPr>
+        <p:spPr>
+          <a:xfrm rot="16200000" flipV="1">
+            <a:off x="4824028" y="4896832"/>
+            <a:ext cx="648072" cy="432048"/>
+          </a:xfrm>
+          <a:prstGeom prst="bentConnector3">
+            <a:avLst>
+              <a:gd name="adj1" fmla="val 36804"/>
+            </a:avLst>
+          </a:prstGeom>
+          <a:ln>
+            <a:solidFill>
+              <a:srgbClr val="7030A0"/>
+            </a:solidFill>
+            <a:headEnd type="oval" w="sm" len="sm"/>
+            <a:tailEnd type="triangle" w="sm" len="sm"/>
+          </a:ln>
+        </p:spPr>
+        <p:style>
+          <a:lnRef idx="1">
+            <a:schemeClr val="accent1"/>
+          </a:lnRef>
+          <a:fillRef idx="0">
+            <a:schemeClr val="accent1"/>
+          </a:fillRef>
+          <a:effectRef idx="0">
+            <a:schemeClr val="accent1"/>
+          </a:effectRef>
+          <a:fontRef idx="minor">
+            <a:schemeClr val="tx1"/>
+          </a:fontRef>
+        </p:style>
+      </p:cxnSp>
+      <p:cxnSp>
+        <p:nvCxnSpPr>
+          <p:cNvPr id="314" name="꺾인 연결선 425"/>
+          <p:cNvCxnSpPr/>
+          <p:nvPr/>
+        </p:nvCxnSpPr>
+        <p:spPr>
+          <a:xfrm rot="16200000" flipH="1">
+            <a:off x="4896036" y="4903946"/>
+            <a:ext cx="648072" cy="432048"/>
+          </a:xfrm>
+          <a:prstGeom prst="bentConnector3">
+            <a:avLst>
+              <a:gd name="adj1" fmla="val 51970"/>
+            </a:avLst>
+          </a:prstGeom>
+          <a:ln>
+            <a:solidFill>
+              <a:srgbClr val="7030A0"/>
+            </a:solidFill>
+            <a:headEnd type="oval" w="sm" len="sm"/>
+            <a:tailEnd type="triangle" w="sm" len="sm"/>
+          </a:ln>
+        </p:spPr>
+        <p:style>
+          <a:lnRef idx="1">
+            <a:schemeClr val="accent1"/>
+          </a:lnRef>
+          <a:fillRef idx="0">
+            <a:schemeClr val="accent1"/>
+          </a:fillRef>
+          <a:effectRef idx="0">
+            <a:schemeClr val="accent1"/>
+          </a:effectRef>
+          <a:fontRef idx="minor">
+            <a:schemeClr val="tx1"/>
+          </a:fontRef>
+        </p:style>
+      </p:cxnSp>
     </p:spTree>
     <p:extLst>
       <p:ext uri="{BB962C8B-B14F-4D97-AF65-F5344CB8AC3E}">
-        <p14:creationId xmlns:p14="http://schemas.microsoft.com/office/powerpoint/2010/main" xmlns="" val="1933598799"/>
+        <p14:creationId xmlns:p14="http://schemas.microsoft.com/office/powerpoint/2010/main" val="1933598799"/>
       </p:ext>
     </p:extLst>
   </p:cSld>

</xml_diff>

<commit_message>
update relation between NM and CM
update relation between NM and CM
</commit_message>
<xml_diff>
--- a/doc/dynamic view 15060900.pptx
+++ b/doc/dynamic view 15060900.pptx
@@ -11483,254 +11483,6 @@
           </a:p>
         </p:txBody>
       </p:sp>
-      <p:sp>
-        <p:nvSpPr>
-          <p:cNvPr id="235" name="직사각형 234"/>
-          <p:cNvSpPr/>
-          <p:nvPr/>
-        </p:nvSpPr>
-        <p:spPr>
-          <a:xfrm>
-            <a:off x="1547664" y="3645024"/>
-            <a:ext cx="72008" cy="72008"/>
-          </a:xfrm>
-          <a:prstGeom prst="rect">
-            <a:avLst/>
-          </a:prstGeom>
-          <a:ln>
-            <a:noFill/>
-          </a:ln>
-        </p:spPr>
-        <p:style>
-          <a:lnRef idx="2">
-            <a:schemeClr val="accent1">
-              <a:shade val="50000"/>
-            </a:schemeClr>
-          </a:lnRef>
-          <a:fillRef idx="1">
-            <a:schemeClr val="accent1"/>
-          </a:fillRef>
-          <a:effectRef idx="0">
-            <a:schemeClr val="accent1"/>
-          </a:effectRef>
-          <a:fontRef idx="minor">
-            <a:schemeClr val="lt1"/>
-          </a:fontRef>
-        </p:style>
-        <p:txBody>
-          <a:bodyPr rtlCol="0" anchor="ctr"/>
-          <a:lstStyle/>
-          <a:p>
-            <a:pPr algn="ctr"/>
-            <a:endParaRPr lang="ko-KR" altLang="en-US"/>
-          </a:p>
-        </p:txBody>
-      </p:sp>
-      <p:sp>
-        <p:nvSpPr>
-          <p:cNvPr id="236" name="직사각형 235"/>
-          <p:cNvSpPr/>
-          <p:nvPr/>
-        </p:nvSpPr>
-        <p:spPr>
-          <a:xfrm>
-            <a:off x="1547664" y="3356992"/>
-            <a:ext cx="72008" cy="72008"/>
-          </a:xfrm>
-          <a:prstGeom prst="rect">
-            <a:avLst/>
-          </a:prstGeom>
-          <a:solidFill>
-            <a:srgbClr val="FF0000"/>
-          </a:solidFill>
-          <a:ln>
-            <a:noFill/>
-          </a:ln>
-        </p:spPr>
-        <p:style>
-          <a:lnRef idx="2">
-            <a:schemeClr val="accent1">
-              <a:shade val="50000"/>
-            </a:schemeClr>
-          </a:lnRef>
-          <a:fillRef idx="1">
-            <a:schemeClr val="accent1"/>
-          </a:fillRef>
-          <a:effectRef idx="0">
-            <a:schemeClr val="accent1"/>
-          </a:effectRef>
-          <a:fontRef idx="minor">
-            <a:schemeClr val="lt1"/>
-          </a:fontRef>
-        </p:style>
-        <p:txBody>
-          <a:bodyPr rtlCol="0" anchor="ctr"/>
-          <a:lstStyle/>
-          <a:p>
-            <a:pPr algn="ctr"/>
-            <a:endParaRPr lang="ko-KR" altLang="en-US"/>
-          </a:p>
-        </p:txBody>
-      </p:sp>
-      <p:cxnSp>
-        <p:nvCxnSpPr>
-          <p:cNvPr id="237" name="꺾인 연결선 236"/>
-          <p:cNvCxnSpPr>
-            <a:stCxn id="235" idx="0"/>
-            <a:endCxn id="236" idx="2"/>
-          </p:cNvCxnSpPr>
-          <p:nvPr/>
-        </p:nvCxnSpPr>
-        <p:spPr>
-          <a:xfrm rot="5400000" flipH="1" flipV="1">
-            <a:off x="1475656" y="3537012"/>
-            <a:ext cx="216024" cy="12700"/>
-          </a:xfrm>
-          <a:prstGeom prst="bentConnector3">
-            <a:avLst>
-              <a:gd name="adj1" fmla="val 50000"/>
-            </a:avLst>
-          </a:prstGeom>
-        </p:spPr>
-        <p:style>
-          <a:lnRef idx="1">
-            <a:schemeClr val="accent1"/>
-          </a:lnRef>
-          <a:fillRef idx="0">
-            <a:schemeClr val="accent1"/>
-          </a:fillRef>
-          <a:effectRef idx="0">
-            <a:schemeClr val="accent1"/>
-          </a:effectRef>
-          <a:fontRef idx="minor">
-            <a:schemeClr val="tx1"/>
-          </a:fontRef>
-        </p:style>
-      </p:cxnSp>
-      <p:sp>
-        <p:nvSpPr>
-          <p:cNvPr id="238" name="직사각형 237"/>
-          <p:cNvSpPr/>
-          <p:nvPr/>
-        </p:nvSpPr>
-        <p:spPr>
-          <a:xfrm>
-            <a:off x="1403648" y="3356992"/>
-            <a:ext cx="72008" cy="72008"/>
-          </a:xfrm>
-          <a:prstGeom prst="rect">
-            <a:avLst/>
-          </a:prstGeom>
-          <a:ln>
-            <a:noFill/>
-          </a:ln>
-        </p:spPr>
-        <p:style>
-          <a:lnRef idx="2">
-            <a:schemeClr val="accent1">
-              <a:shade val="50000"/>
-            </a:schemeClr>
-          </a:lnRef>
-          <a:fillRef idx="1">
-            <a:schemeClr val="accent1"/>
-          </a:fillRef>
-          <a:effectRef idx="0">
-            <a:schemeClr val="accent1"/>
-          </a:effectRef>
-          <a:fontRef idx="minor">
-            <a:schemeClr val="lt1"/>
-          </a:fontRef>
-        </p:style>
-        <p:txBody>
-          <a:bodyPr rtlCol="0" anchor="ctr"/>
-          <a:lstStyle/>
-          <a:p>
-            <a:pPr algn="ctr"/>
-            <a:endParaRPr lang="ko-KR" altLang="en-US"/>
-          </a:p>
-        </p:txBody>
-      </p:sp>
-      <p:cxnSp>
-        <p:nvCxnSpPr>
-          <p:cNvPr id="245" name="꺾인 연결선 244"/>
-          <p:cNvCxnSpPr>
-            <a:stCxn id="238" idx="2"/>
-            <a:endCxn id="246" idx="0"/>
-          </p:cNvCxnSpPr>
-          <p:nvPr/>
-        </p:nvCxnSpPr>
-        <p:spPr>
-          <a:xfrm rot="5400000">
-            <a:off x="1331640" y="3537012"/>
-            <a:ext cx="216024" cy="12700"/>
-          </a:xfrm>
-          <a:prstGeom prst="bentConnector3">
-            <a:avLst>
-              <a:gd name="adj1" fmla="val 50000"/>
-            </a:avLst>
-          </a:prstGeom>
-        </p:spPr>
-        <p:style>
-          <a:lnRef idx="1">
-            <a:schemeClr val="accent1"/>
-          </a:lnRef>
-          <a:fillRef idx="0">
-            <a:schemeClr val="accent1"/>
-          </a:fillRef>
-          <a:effectRef idx="0">
-            <a:schemeClr val="accent1"/>
-          </a:effectRef>
-          <a:fontRef idx="minor">
-            <a:schemeClr val="tx1"/>
-          </a:fontRef>
-        </p:style>
-      </p:cxnSp>
-      <p:sp>
-        <p:nvSpPr>
-          <p:cNvPr id="246" name="직사각형 245"/>
-          <p:cNvSpPr/>
-          <p:nvPr/>
-        </p:nvSpPr>
-        <p:spPr>
-          <a:xfrm>
-            <a:off x="1403648" y="3645024"/>
-            <a:ext cx="72008" cy="72008"/>
-          </a:xfrm>
-          <a:prstGeom prst="rect">
-            <a:avLst/>
-          </a:prstGeom>
-          <a:solidFill>
-            <a:srgbClr val="FF0000"/>
-          </a:solidFill>
-          <a:ln>
-            <a:noFill/>
-          </a:ln>
-        </p:spPr>
-        <p:style>
-          <a:lnRef idx="2">
-            <a:schemeClr val="accent1">
-              <a:shade val="50000"/>
-            </a:schemeClr>
-          </a:lnRef>
-          <a:fillRef idx="1">
-            <a:schemeClr val="accent1"/>
-          </a:fillRef>
-          <a:effectRef idx="0">
-            <a:schemeClr val="accent1"/>
-          </a:effectRef>
-          <a:fontRef idx="minor">
-            <a:schemeClr val="lt1"/>
-          </a:fontRef>
-        </p:style>
-        <p:txBody>
-          <a:bodyPr rtlCol="0" anchor="ctr"/>
-          <a:lstStyle/>
-          <a:p>
-            <a:pPr algn="ctr"/>
-            <a:endParaRPr lang="ko-KR" altLang="en-US"/>
-          </a:p>
-        </p:txBody>
-      </p:sp>
       <p:cxnSp>
         <p:nvCxnSpPr>
           <p:cNvPr id="293" name="꺾인 연결선 425"/>
@@ -12913,6 +12665,84 @@
           <a:prstGeom prst="bentConnector3">
             <a:avLst>
               <a:gd name="adj1" fmla="val 51970"/>
+            </a:avLst>
+          </a:prstGeom>
+          <a:ln>
+            <a:solidFill>
+              <a:srgbClr val="7030A0"/>
+            </a:solidFill>
+            <a:headEnd type="oval" w="sm" len="sm"/>
+            <a:tailEnd type="triangle" w="sm" len="sm"/>
+          </a:ln>
+        </p:spPr>
+        <p:style>
+          <a:lnRef idx="1">
+            <a:schemeClr val="accent1"/>
+          </a:lnRef>
+          <a:fillRef idx="0">
+            <a:schemeClr val="accent1"/>
+          </a:fillRef>
+          <a:effectRef idx="0">
+            <a:schemeClr val="accent1"/>
+          </a:effectRef>
+          <a:fontRef idx="minor">
+            <a:schemeClr val="tx1"/>
+          </a:fontRef>
+        </p:style>
+      </p:cxnSp>
+      <p:cxnSp>
+        <p:nvCxnSpPr>
+          <p:cNvPr id="204" name="꺾인 연결선 425"/>
+          <p:cNvCxnSpPr/>
+          <p:nvPr/>
+        </p:nvCxnSpPr>
+        <p:spPr>
+          <a:xfrm flipV="1">
+            <a:off x="2303748" y="3875844"/>
+            <a:ext cx="1476164" cy="36004"/>
+          </a:xfrm>
+          <a:prstGeom prst="bentConnector3">
+            <a:avLst>
+              <a:gd name="adj1" fmla="val 50000"/>
+            </a:avLst>
+          </a:prstGeom>
+          <a:ln>
+            <a:solidFill>
+              <a:srgbClr val="7030A0"/>
+            </a:solidFill>
+            <a:headEnd type="oval" w="sm" len="sm"/>
+            <a:tailEnd type="triangle" w="sm" len="sm"/>
+          </a:ln>
+        </p:spPr>
+        <p:style>
+          <a:lnRef idx="1">
+            <a:schemeClr val="accent1"/>
+          </a:lnRef>
+          <a:fillRef idx="0">
+            <a:schemeClr val="accent1"/>
+          </a:fillRef>
+          <a:effectRef idx="0">
+            <a:schemeClr val="accent1"/>
+          </a:effectRef>
+          <a:fontRef idx="minor">
+            <a:schemeClr val="tx1"/>
+          </a:fontRef>
+        </p:style>
+      </p:cxnSp>
+      <p:cxnSp>
+        <p:nvCxnSpPr>
+          <p:cNvPr id="210" name="꺾인 연결선 425"/>
+          <p:cNvCxnSpPr/>
+          <p:nvPr/>
+        </p:nvCxnSpPr>
+        <p:spPr>
+          <a:xfrm rot="10800000" flipV="1">
+            <a:off x="2303748" y="3956359"/>
+            <a:ext cx="1476164" cy="36004"/>
+          </a:xfrm>
+          <a:prstGeom prst="bentConnector3">
+            <a:avLst>
+              <a:gd name="adj1" fmla="val 50000"/>
             </a:avLst>
           </a:prstGeom>
           <a:ln>

</xml_diff>